<commit_message>
Add installing Ubuntu on VM
</commit_message>
<xml_diff>
--- a/figures.pptx
+++ b/figures.pptx
@@ -5,7 +5,8 @@
     <p:sldMasterId id="2147483648" r:id="rId1"/>
   </p:sldMasterIdLst>
   <p:sldIdLst>
-    <p:sldId id="256" r:id="rId2"/>
+    <p:sldId id="258" r:id="rId2"/>
+    <p:sldId id="257" r:id="rId3"/>
   </p:sldIdLst>
   <p:sldSz cx="12192000" cy="6858000"/>
   <p:notesSz cx="6858000" cy="9144000"/>
@@ -104,6 +105,11 @@
       </a:defRPr>
     </a:lvl9pPr>
   </p:defaultTextStyle>
+  <p:extLst>
+    <p:ext uri="{EFAFB233-063F-42B5-8137-9DF3F51BA10A}">
+      <p15:sldGuideLst xmlns:p15="http://schemas.microsoft.com/office/powerpoint/2012/main"/>
+    </p:ext>
+  </p:extLst>
 </p:presentation>
 </file>
 
@@ -238,7 +244,7 @@
           <a:p>
             <a:fld id="{6DDC91D1-A30A-44DB-A00A-4EBC475D95F9}" type="datetimeFigureOut">
               <a:rPr lang="en-US" smtClean="0"/>
-              <a:t>9/10/2014</a:t>
+              <a:t>9/26/2014</a:t>
             </a:fld>
             <a:endParaRPr lang="en-US"/>
           </a:p>
@@ -408,7 +414,7 @@
           <a:p>
             <a:fld id="{6DDC91D1-A30A-44DB-A00A-4EBC475D95F9}" type="datetimeFigureOut">
               <a:rPr lang="en-US" smtClean="0"/>
-              <a:t>9/10/2014</a:t>
+              <a:t>9/26/2014</a:t>
             </a:fld>
             <a:endParaRPr lang="en-US"/>
           </a:p>
@@ -588,7 +594,7 @@
           <a:p>
             <a:fld id="{6DDC91D1-A30A-44DB-A00A-4EBC475D95F9}" type="datetimeFigureOut">
               <a:rPr lang="en-US" smtClean="0"/>
-              <a:t>9/10/2014</a:t>
+              <a:t>9/26/2014</a:t>
             </a:fld>
             <a:endParaRPr lang="en-US"/>
           </a:p>
@@ -758,7 +764,7 @@
           <a:p>
             <a:fld id="{6DDC91D1-A30A-44DB-A00A-4EBC475D95F9}" type="datetimeFigureOut">
               <a:rPr lang="en-US" smtClean="0"/>
-              <a:t>9/10/2014</a:t>
+              <a:t>9/26/2014</a:t>
             </a:fld>
             <a:endParaRPr lang="en-US"/>
           </a:p>
@@ -1004,7 +1010,7 @@
           <a:p>
             <a:fld id="{6DDC91D1-A30A-44DB-A00A-4EBC475D95F9}" type="datetimeFigureOut">
               <a:rPr lang="en-US" smtClean="0"/>
-              <a:t>9/10/2014</a:t>
+              <a:t>9/26/2014</a:t>
             </a:fld>
             <a:endParaRPr lang="en-US"/>
           </a:p>
@@ -1236,7 +1242,7 @@
           <a:p>
             <a:fld id="{6DDC91D1-A30A-44DB-A00A-4EBC475D95F9}" type="datetimeFigureOut">
               <a:rPr lang="en-US" smtClean="0"/>
-              <a:t>9/10/2014</a:t>
+              <a:t>9/26/2014</a:t>
             </a:fld>
             <a:endParaRPr lang="en-US"/>
           </a:p>
@@ -1603,7 +1609,7 @@
           <a:p>
             <a:fld id="{6DDC91D1-A30A-44DB-A00A-4EBC475D95F9}" type="datetimeFigureOut">
               <a:rPr lang="en-US" smtClean="0"/>
-              <a:t>9/10/2014</a:t>
+              <a:t>9/26/2014</a:t>
             </a:fld>
             <a:endParaRPr lang="en-US"/>
           </a:p>
@@ -1721,7 +1727,7 @@
           <a:p>
             <a:fld id="{6DDC91D1-A30A-44DB-A00A-4EBC475D95F9}" type="datetimeFigureOut">
               <a:rPr lang="en-US" smtClean="0"/>
-              <a:t>9/10/2014</a:t>
+              <a:t>9/26/2014</a:t>
             </a:fld>
             <a:endParaRPr lang="en-US"/>
           </a:p>
@@ -1816,7 +1822,7 @@
           <a:p>
             <a:fld id="{6DDC91D1-A30A-44DB-A00A-4EBC475D95F9}" type="datetimeFigureOut">
               <a:rPr lang="en-US" smtClean="0"/>
-              <a:t>9/10/2014</a:t>
+              <a:t>9/26/2014</a:t>
             </a:fld>
             <a:endParaRPr lang="en-US"/>
           </a:p>
@@ -2093,7 +2099,7 @@
           <a:p>
             <a:fld id="{6DDC91D1-A30A-44DB-A00A-4EBC475D95F9}" type="datetimeFigureOut">
               <a:rPr lang="en-US" smtClean="0"/>
-              <a:t>9/10/2014</a:t>
+              <a:t>9/26/2014</a:t>
             </a:fld>
             <a:endParaRPr lang="en-US"/>
           </a:p>
@@ -2346,7 +2352,7 @@
           <a:p>
             <a:fld id="{6DDC91D1-A30A-44DB-A00A-4EBC475D95F9}" type="datetimeFigureOut">
               <a:rPr lang="en-US" smtClean="0"/>
-              <a:t>9/10/2014</a:t>
+              <a:t>9/26/2014</a:t>
             </a:fld>
             <a:endParaRPr lang="en-US"/>
           </a:p>
@@ -2559,7 +2565,7 @@
           <a:p>
             <a:fld id="{6DDC91D1-A30A-44DB-A00A-4EBC475D95F9}" type="datetimeFigureOut">
               <a:rPr lang="en-US" smtClean="0"/>
-              <a:t>9/10/2014</a:t>
+              <a:t>9/26/2014</a:t>
             </a:fld>
             <a:endParaRPr lang="en-US"/>
           </a:p>
@@ -2966,13 +2972,13 @@
       </p:grpSpPr>
       <p:grpSp>
         <p:nvGrpSpPr>
-          <p:cNvPr id="19" name="Group 18"/>
+          <p:cNvPr id="2" name="Group 1"/>
           <p:cNvGrpSpPr/>
           <p:nvPr/>
         </p:nvGrpSpPr>
         <p:grpSpPr>
           <a:xfrm>
-            <a:off x="2230339" y="1440383"/>
+            <a:off x="2250888" y="1471205"/>
             <a:ext cx="6750952" cy="4114800"/>
             <a:chOff x="2230339" y="1440383"/>
             <a:chExt cx="6750952" cy="4114800"/>
@@ -2980,7 +2986,7 @@
         </p:grpSpPr>
         <p:pic>
           <p:nvPicPr>
-            <p:cNvPr id="6" name="Picture 5"/>
+            <p:cNvPr id="3" name="Picture 2"/>
             <p:cNvPicPr>
               <a:picLocks noChangeAspect="1"/>
             </p:cNvPicPr>
@@ -3004,7 +3010,7 @@
         </p:pic>
         <p:pic>
           <p:nvPicPr>
-            <p:cNvPr id="1028" name="Picture 4" descr="http://elinux.org/images/2/2a/GPIOs.png"/>
+            <p:cNvPr id="4" name="Picture 4" descr="http://elinux.org/images/2/2a/GPIOs.png"/>
             <p:cNvPicPr>
               <a:picLocks noChangeAspect="1" noChangeArrowheads="1"/>
             </p:cNvPicPr>
@@ -3045,7 +3051,7 @@
         </p:pic>
         <p:cxnSp>
           <p:nvCxnSpPr>
-            <p:cNvPr id="8" name="Straight Connector 7"/>
+            <p:cNvPr id="5" name="Straight Connector 4"/>
             <p:cNvCxnSpPr/>
             <p:nvPr/>
           </p:nvCxnSpPr>
@@ -3080,7 +3086,7 @@
         </p:cxnSp>
         <p:cxnSp>
           <p:nvCxnSpPr>
-            <p:cNvPr id="13" name="Straight Connector 12"/>
+            <p:cNvPr id="6" name="Straight Connector 5"/>
             <p:cNvCxnSpPr/>
             <p:nvPr/>
           </p:nvCxnSpPr>
@@ -3115,7 +3121,7 @@
         </p:cxnSp>
         <p:cxnSp>
           <p:nvCxnSpPr>
-            <p:cNvPr id="16" name="Straight Connector 15"/>
+            <p:cNvPr id="7" name="Straight Connector 6"/>
             <p:cNvCxnSpPr/>
             <p:nvPr/>
           </p:nvCxnSpPr>
@@ -3152,7 +3158,305 @@
     </p:spTree>
     <p:extLst>
       <p:ext uri="{BB962C8B-B14F-4D97-AF65-F5344CB8AC3E}">
-        <p14:creationId xmlns:p14="http://schemas.microsoft.com/office/powerpoint/2010/main" val="54216363"/>
+        <p14:creationId xmlns:p14="http://schemas.microsoft.com/office/powerpoint/2010/main" val="2070165898"/>
+      </p:ext>
+    </p:extLst>
+  </p:cSld>
+  <p:clrMapOvr>
+    <a:masterClrMapping/>
+  </p:clrMapOvr>
+  <p:timing>
+    <p:tnLst>
+      <p:par>
+        <p:cTn id="1" dur="indefinite" restart="never" nodeType="tmRoot"/>
+      </p:par>
+    </p:tnLst>
+  </p:timing>
+</p:sld>
+</file>
+
+<file path=ppt/slides/slide2.xml><?xml version="1.0" encoding="utf-8"?>
+<p:sld xmlns:a="http://schemas.openxmlformats.org/drawingml/2006/main" xmlns:r="http://schemas.openxmlformats.org/officeDocument/2006/relationships" xmlns:p="http://schemas.openxmlformats.org/presentationml/2006/main">
+  <p:cSld>
+    <p:spTree>
+      <p:nvGrpSpPr>
+        <p:cNvPr id="1" name=""/>
+        <p:cNvGrpSpPr/>
+        <p:nvPr/>
+      </p:nvGrpSpPr>
+      <p:grpSpPr>
+        <a:xfrm>
+          <a:off x="0" y="0"/>
+          <a:ext cx="0" cy="0"/>
+          <a:chOff x="0" y="0"/>
+          <a:chExt cx="0" cy="0"/>
+        </a:xfrm>
+      </p:grpSpPr>
+      <p:grpSp>
+        <p:nvGrpSpPr>
+          <p:cNvPr id="12" name="Group 11"/>
+          <p:cNvGrpSpPr/>
+          <p:nvPr/>
+        </p:nvGrpSpPr>
+        <p:grpSpPr>
+          <a:xfrm>
+            <a:off x="613560" y="1593835"/>
+            <a:ext cx="9505950" cy="4086225"/>
+            <a:chOff x="613560" y="1593835"/>
+            <a:chExt cx="9505950" cy="4086225"/>
+          </a:xfrm>
+        </p:grpSpPr>
+        <p:pic>
+          <p:nvPicPr>
+            <p:cNvPr id="10" name="Picture 9"/>
+            <p:cNvPicPr>
+              <a:picLocks noChangeAspect="1"/>
+            </p:cNvPicPr>
+            <p:nvPr/>
+          </p:nvPicPr>
+          <p:blipFill>
+            <a:blip r:embed="rId2"/>
+            <a:stretch>
+              <a:fillRect/>
+            </a:stretch>
+          </p:blipFill>
+          <p:spPr>
+            <a:xfrm>
+              <a:off x="613560" y="1593835"/>
+              <a:ext cx="9505950" cy="4086225"/>
+            </a:xfrm>
+            <a:prstGeom prst="rect">
+              <a:avLst/>
+            </a:prstGeom>
+          </p:spPr>
+        </p:pic>
+        <p:cxnSp>
+          <p:nvCxnSpPr>
+            <p:cNvPr id="4" name="Straight Arrow Connector 3"/>
+            <p:cNvCxnSpPr/>
+            <p:nvPr/>
+          </p:nvCxnSpPr>
+          <p:spPr>
+            <a:xfrm flipH="1">
+              <a:off x="3236360" y="2219219"/>
+              <a:ext cx="369869" cy="657546"/>
+            </a:xfrm>
+            <a:prstGeom prst="straightConnector1">
+              <a:avLst/>
+            </a:prstGeom>
+            <a:ln w="57150">
+              <a:solidFill>
+                <a:srgbClr val="FF0000"/>
+              </a:solidFill>
+              <a:tailEnd type="triangle"/>
+            </a:ln>
+          </p:spPr>
+          <p:style>
+            <a:lnRef idx="1">
+              <a:schemeClr val="accent1"/>
+            </a:lnRef>
+            <a:fillRef idx="0">
+              <a:schemeClr val="accent1"/>
+            </a:fillRef>
+            <a:effectRef idx="0">
+              <a:schemeClr val="accent1"/>
+            </a:effectRef>
+            <a:fontRef idx="minor">
+              <a:schemeClr val="tx1"/>
+            </a:fontRef>
+          </p:style>
+        </p:cxnSp>
+        <p:sp>
+          <p:nvSpPr>
+            <p:cNvPr id="6" name="TextBox 5"/>
+            <p:cNvSpPr txBox="1"/>
+            <p:nvPr/>
+          </p:nvSpPr>
+          <p:spPr>
+            <a:xfrm>
+              <a:off x="3565135" y="1934644"/>
+              <a:ext cx="490840" cy="369332"/>
+            </a:xfrm>
+            <a:prstGeom prst="rect">
+              <a:avLst/>
+            </a:prstGeom>
+            <a:noFill/>
+          </p:spPr>
+          <p:txBody>
+            <a:bodyPr wrap="none" rtlCol="0">
+              <a:spAutoFit/>
+            </a:bodyPr>
+            <a:lstStyle/>
+            <a:p>
+              <a:r>
+                <a:rPr lang="en-US" dirty="0" smtClean="0">
+                  <a:solidFill>
+                    <a:srgbClr val="FF0000"/>
+                  </a:solidFill>
+                </a:rPr>
+                <a:t>❶</a:t>
+              </a:r>
+              <a:endParaRPr lang="en-US" dirty="0">
+                <a:solidFill>
+                  <a:srgbClr val="FF0000"/>
+                </a:solidFill>
+              </a:endParaRPr>
+            </a:p>
+          </p:txBody>
+        </p:sp>
+        <p:cxnSp>
+          <p:nvCxnSpPr>
+            <p:cNvPr id="7" name="Straight Arrow Connector 6"/>
+            <p:cNvCxnSpPr/>
+            <p:nvPr/>
+          </p:nvCxnSpPr>
+          <p:spPr>
+            <a:xfrm flipH="1">
+              <a:off x="6635874" y="1986014"/>
+              <a:ext cx="369869" cy="657546"/>
+            </a:xfrm>
+            <a:prstGeom prst="straightConnector1">
+              <a:avLst/>
+            </a:prstGeom>
+            <a:ln w="57150">
+              <a:solidFill>
+                <a:srgbClr val="FF0000"/>
+              </a:solidFill>
+              <a:tailEnd type="triangle"/>
+            </a:ln>
+          </p:spPr>
+          <p:style>
+            <a:lnRef idx="1">
+              <a:schemeClr val="accent1"/>
+            </a:lnRef>
+            <a:fillRef idx="0">
+              <a:schemeClr val="accent1"/>
+            </a:fillRef>
+            <a:effectRef idx="0">
+              <a:schemeClr val="accent1"/>
+            </a:effectRef>
+            <a:fontRef idx="minor">
+              <a:schemeClr val="tx1"/>
+            </a:fontRef>
+          </p:style>
+        </p:cxnSp>
+        <p:sp>
+          <p:nvSpPr>
+            <p:cNvPr id="8" name="TextBox 7"/>
+            <p:cNvSpPr txBox="1"/>
+            <p:nvPr/>
+          </p:nvSpPr>
+          <p:spPr>
+            <a:xfrm>
+              <a:off x="6903003" y="1616682"/>
+              <a:ext cx="490840" cy="369332"/>
+            </a:xfrm>
+            <a:prstGeom prst="rect">
+              <a:avLst/>
+            </a:prstGeom>
+            <a:noFill/>
+          </p:spPr>
+          <p:txBody>
+            <a:bodyPr wrap="none" rtlCol="0">
+              <a:spAutoFit/>
+            </a:bodyPr>
+            <a:lstStyle/>
+            <a:p>
+              <a:r>
+                <a:rPr lang="en-US" dirty="0" smtClean="0">
+                  <a:solidFill>
+                    <a:srgbClr val="FF0000"/>
+                  </a:solidFill>
+                </a:rPr>
+                <a:t>❷</a:t>
+              </a:r>
+              <a:endParaRPr lang="en-US" dirty="0">
+                <a:solidFill>
+                  <a:srgbClr val="FF0000"/>
+                </a:solidFill>
+              </a:endParaRPr>
+            </a:p>
+          </p:txBody>
+        </p:sp>
+        <p:sp>
+          <p:nvSpPr>
+            <p:cNvPr id="9" name="TextBox 8"/>
+            <p:cNvSpPr txBox="1"/>
+            <p:nvPr/>
+          </p:nvSpPr>
+          <p:spPr>
+            <a:xfrm>
+              <a:off x="9175643" y="1986014"/>
+              <a:ext cx="490840" cy="369332"/>
+            </a:xfrm>
+            <a:prstGeom prst="rect">
+              <a:avLst/>
+            </a:prstGeom>
+            <a:noFill/>
+          </p:spPr>
+          <p:txBody>
+            <a:bodyPr wrap="none" rtlCol="0">
+              <a:spAutoFit/>
+            </a:bodyPr>
+            <a:lstStyle/>
+            <a:p>
+              <a:r>
+                <a:rPr lang="en-US" dirty="0" smtClean="0">
+                  <a:solidFill>
+                    <a:srgbClr val="FF0000"/>
+                  </a:solidFill>
+                </a:rPr>
+                <a:t>❸</a:t>
+              </a:r>
+              <a:endParaRPr lang="en-US" dirty="0">
+                <a:solidFill>
+                  <a:srgbClr val="FF0000"/>
+                </a:solidFill>
+              </a:endParaRPr>
+            </a:p>
+          </p:txBody>
+        </p:sp>
+        <p:cxnSp>
+          <p:nvCxnSpPr>
+            <p:cNvPr id="11" name="Straight Arrow Connector 10"/>
+            <p:cNvCxnSpPr/>
+            <p:nvPr/>
+          </p:nvCxnSpPr>
+          <p:spPr>
+            <a:xfrm flipH="1">
+              <a:off x="8843587" y="2252606"/>
+              <a:ext cx="369869" cy="657546"/>
+            </a:xfrm>
+            <a:prstGeom prst="straightConnector1">
+              <a:avLst/>
+            </a:prstGeom>
+            <a:ln w="57150">
+              <a:solidFill>
+                <a:srgbClr val="FF0000"/>
+              </a:solidFill>
+              <a:tailEnd type="triangle"/>
+            </a:ln>
+          </p:spPr>
+          <p:style>
+            <a:lnRef idx="1">
+              <a:schemeClr val="accent1"/>
+            </a:lnRef>
+            <a:fillRef idx="0">
+              <a:schemeClr val="accent1"/>
+            </a:fillRef>
+            <a:effectRef idx="0">
+              <a:schemeClr val="accent1"/>
+            </a:effectRef>
+            <a:fontRef idx="minor">
+              <a:schemeClr val="tx1"/>
+            </a:fontRef>
+          </p:style>
+        </p:cxnSp>
+      </p:grpSp>
+    </p:spTree>
+    <p:extLst>
+      <p:ext uri="{BB962C8B-B14F-4D97-AF65-F5344CB8AC3E}">
+        <p14:creationId xmlns:p14="http://schemas.microsoft.com/office/powerpoint/2010/main" val="2373711104"/>
       </p:ext>
     </p:extLst>
   </p:cSld>

</xml_diff>

<commit_message>
Last academic year changes that were not commit. Shame on me
</commit_message>
<xml_diff>
--- a/figures.pptx
+++ b/figures.pptx
@@ -7,6 +7,8 @@
   <p:sldIdLst>
     <p:sldId id="258" r:id="rId2"/>
     <p:sldId id="257" r:id="rId3"/>
+    <p:sldId id="261" r:id="rId4"/>
+    <p:sldId id="262" r:id="rId5"/>
   </p:sldIdLst>
   <p:sldSz cx="12192000" cy="6858000"/>
   <p:notesSz cx="6858000" cy="9144000"/>
@@ -244,7 +246,7 @@
           <a:p>
             <a:fld id="{6DDC91D1-A30A-44DB-A00A-4EBC475D95F9}" type="datetimeFigureOut">
               <a:rPr lang="en-US" smtClean="0"/>
-              <a:t>9/26/2014</a:t>
+              <a:t>10/14/2014</a:t>
             </a:fld>
             <a:endParaRPr lang="en-US"/>
           </a:p>
@@ -414,7 +416,7 @@
           <a:p>
             <a:fld id="{6DDC91D1-A30A-44DB-A00A-4EBC475D95F9}" type="datetimeFigureOut">
               <a:rPr lang="en-US" smtClean="0"/>
-              <a:t>9/26/2014</a:t>
+              <a:t>10/14/2014</a:t>
             </a:fld>
             <a:endParaRPr lang="en-US"/>
           </a:p>
@@ -594,7 +596,7 @@
           <a:p>
             <a:fld id="{6DDC91D1-A30A-44DB-A00A-4EBC475D95F9}" type="datetimeFigureOut">
               <a:rPr lang="en-US" smtClean="0"/>
-              <a:t>9/26/2014</a:t>
+              <a:t>10/14/2014</a:t>
             </a:fld>
             <a:endParaRPr lang="en-US"/>
           </a:p>
@@ -764,7 +766,7 @@
           <a:p>
             <a:fld id="{6DDC91D1-A30A-44DB-A00A-4EBC475D95F9}" type="datetimeFigureOut">
               <a:rPr lang="en-US" smtClean="0"/>
-              <a:t>9/26/2014</a:t>
+              <a:t>10/14/2014</a:t>
             </a:fld>
             <a:endParaRPr lang="en-US"/>
           </a:p>
@@ -1010,7 +1012,7 @@
           <a:p>
             <a:fld id="{6DDC91D1-A30A-44DB-A00A-4EBC475D95F9}" type="datetimeFigureOut">
               <a:rPr lang="en-US" smtClean="0"/>
-              <a:t>9/26/2014</a:t>
+              <a:t>10/14/2014</a:t>
             </a:fld>
             <a:endParaRPr lang="en-US"/>
           </a:p>
@@ -1242,7 +1244,7 @@
           <a:p>
             <a:fld id="{6DDC91D1-A30A-44DB-A00A-4EBC475D95F9}" type="datetimeFigureOut">
               <a:rPr lang="en-US" smtClean="0"/>
-              <a:t>9/26/2014</a:t>
+              <a:t>10/14/2014</a:t>
             </a:fld>
             <a:endParaRPr lang="en-US"/>
           </a:p>
@@ -1609,7 +1611,7 @@
           <a:p>
             <a:fld id="{6DDC91D1-A30A-44DB-A00A-4EBC475D95F9}" type="datetimeFigureOut">
               <a:rPr lang="en-US" smtClean="0"/>
-              <a:t>9/26/2014</a:t>
+              <a:t>10/14/2014</a:t>
             </a:fld>
             <a:endParaRPr lang="en-US"/>
           </a:p>
@@ -1727,7 +1729,7 @@
           <a:p>
             <a:fld id="{6DDC91D1-A30A-44DB-A00A-4EBC475D95F9}" type="datetimeFigureOut">
               <a:rPr lang="en-US" smtClean="0"/>
-              <a:t>9/26/2014</a:t>
+              <a:t>10/14/2014</a:t>
             </a:fld>
             <a:endParaRPr lang="en-US"/>
           </a:p>
@@ -1822,7 +1824,7 @@
           <a:p>
             <a:fld id="{6DDC91D1-A30A-44DB-A00A-4EBC475D95F9}" type="datetimeFigureOut">
               <a:rPr lang="en-US" smtClean="0"/>
-              <a:t>9/26/2014</a:t>
+              <a:t>10/14/2014</a:t>
             </a:fld>
             <a:endParaRPr lang="en-US"/>
           </a:p>
@@ -2099,7 +2101,7 @@
           <a:p>
             <a:fld id="{6DDC91D1-A30A-44DB-A00A-4EBC475D95F9}" type="datetimeFigureOut">
               <a:rPr lang="en-US" smtClean="0"/>
-              <a:t>9/26/2014</a:t>
+              <a:t>10/14/2014</a:t>
             </a:fld>
             <a:endParaRPr lang="en-US"/>
           </a:p>
@@ -2352,7 +2354,7 @@
           <a:p>
             <a:fld id="{6DDC91D1-A30A-44DB-A00A-4EBC475D95F9}" type="datetimeFigureOut">
               <a:rPr lang="en-US" smtClean="0"/>
-              <a:t>9/26/2014</a:t>
+              <a:t>10/14/2014</a:t>
             </a:fld>
             <a:endParaRPr lang="en-US"/>
           </a:p>
@@ -2565,7 +2567,7 @@
           <a:p>
             <a:fld id="{6DDC91D1-A30A-44DB-A00A-4EBC475D95F9}" type="datetimeFigureOut">
               <a:rPr lang="en-US" smtClean="0"/>
-              <a:t>9/26/2014</a:t>
+              <a:t>10/14/2014</a:t>
             </a:fld>
             <a:endParaRPr lang="en-US"/>
           </a:p>
@@ -3473,6 +3475,2811 @@
 </p:sld>
 </file>
 
+<file path=ppt/slides/slide3.xml><?xml version="1.0" encoding="utf-8"?>
+<p:sld xmlns:a="http://schemas.openxmlformats.org/drawingml/2006/main" xmlns:r="http://schemas.openxmlformats.org/officeDocument/2006/relationships" xmlns:p="http://schemas.openxmlformats.org/presentationml/2006/main">
+  <p:cSld>
+    <p:spTree>
+      <p:nvGrpSpPr>
+        <p:cNvPr id="1" name=""/>
+        <p:cNvGrpSpPr/>
+        <p:nvPr/>
+      </p:nvGrpSpPr>
+      <p:grpSpPr>
+        <a:xfrm>
+          <a:off x="0" y="0"/>
+          <a:ext cx="0" cy="0"/>
+          <a:chOff x="0" y="0"/>
+          <a:chExt cx="0" cy="0"/>
+        </a:xfrm>
+      </p:grpSpPr>
+      <p:grpSp>
+        <p:nvGrpSpPr>
+          <p:cNvPr id="9" name="Group 8"/>
+          <p:cNvGrpSpPr/>
+          <p:nvPr/>
+        </p:nvGrpSpPr>
+        <p:grpSpPr>
+          <a:xfrm>
+            <a:off x="687824" y="149670"/>
+            <a:ext cx="6478443" cy="1638870"/>
+            <a:chOff x="687824" y="149670"/>
+            <a:chExt cx="6478443" cy="1638870"/>
+          </a:xfrm>
+        </p:grpSpPr>
+        <p:sp>
+          <p:nvSpPr>
+            <p:cNvPr id="2" name="Rounded Rectangle 1"/>
+            <p:cNvSpPr/>
+            <p:nvPr/>
+          </p:nvSpPr>
+          <p:spPr>
+            <a:xfrm>
+              <a:off x="3288736" y="149670"/>
+              <a:ext cx="1521303" cy="339866"/>
+            </a:xfrm>
+            <a:prstGeom prst="roundRect">
+              <a:avLst/>
+            </a:prstGeom>
+          </p:spPr>
+          <p:style>
+            <a:lnRef idx="0">
+              <a:schemeClr val="accent3"/>
+            </a:lnRef>
+            <a:fillRef idx="3">
+              <a:schemeClr val="accent3"/>
+            </a:fillRef>
+            <a:effectRef idx="3">
+              <a:schemeClr val="accent3"/>
+            </a:effectRef>
+            <a:fontRef idx="minor">
+              <a:schemeClr val="lt1"/>
+            </a:fontRef>
+          </p:style>
+          <p:txBody>
+            <a:bodyPr rtlCol="0" anchor="ctr"/>
+            <a:lstStyle/>
+            <a:p>
+              <a:pPr algn="ctr"/>
+              <a:r>
+                <a:rPr lang="en-US" sz="1600" dirty="0" err="1" smtClean="0"/>
+                <a:t>Binutils</a:t>
+              </a:r>
+              <a:r>
+                <a:rPr lang="en-US" sz="1600" dirty="0" smtClean="0"/>
+                <a:t> source</a:t>
+              </a:r>
+              <a:endParaRPr lang="en-US" sz="1600" dirty="0"/>
+            </a:p>
+          </p:txBody>
+        </p:sp>
+        <p:sp>
+          <p:nvSpPr>
+            <p:cNvPr id="3" name="Rounded Rectangle 2"/>
+            <p:cNvSpPr/>
+            <p:nvPr/>
+          </p:nvSpPr>
+          <p:spPr>
+            <a:xfrm>
+              <a:off x="3050697" y="964554"/>
+              <a:ext cx="1997385" cy="823986"/>
+            </a:xfrm>
+            <a:prstGeom prst="roundRect">
+              <a:avLst/>
+            </a:prstGeom>
+          </p:spPr>
+          <p:style>
+            <a:lnRef idx="0">
+              <a:schemeClr val="accent6"/>
+            </a:lnRef>
+            <a:fillRef idx="3">
+              <a:schemeClr val="accent6"/>
+            </a:fillRef>
+            <a:effectRef idx="3">
+              <a:schemeClr val="accent6"/>
+            </a:effectRef>
+            <a:fontRef idx="minor">
+              <a:schemeClr val="lt1"/>
+            </a:fontRef>
+          </p:style>
+          <p:txBody>
+            <a:bodyPr rtlCol="0" anchor="t"/>
+            <a:lstStyle/>
+            <a:p>
+              <a:pPr algn="ctr"/>
+              <a:r>
+                <a:rPr lang="en-US" sz="1600" dirty="0" smtClean="0"/>
+                <a:t>Compiler, assembler and linker</a:t>
+              </a:r>
+              <a:endParaRPr lang="en-US" sz="1600" dirty="0"/>
+            </a:p>
+          </p:txBody>
+        </p:sp>
+        <p:sp>
+          <p:nvSpPr>
+            <p:cNvPr id="4" name="Rounded Rectangle 3"/>
+            <p:cNvSpPr/>
+            <p:nvPr/>
+          </p:nvSpPr>
+          <p:spPr>
+            <a:xfrm>
+              <a:off x="3444075" y="1574725"/>
+              <a:ext cx="1210627" cy="210392"/>
+            </a:xfrm>
+            <a:prstGeom prst="roundRect">
+              <a:avLst/>
+            </a:prstGeom>
+          </p:spPr>
+          <p:style>
+            <a:lnRef idx="0">
+              <a:schemeClr val="dk1"/>
+            </a:lnRef>
+            <a:fillRef idx="3">
+              <a:schemeClr val="dk1"/>
+            </a:fillRef>
+            <a:effectRef idx="3">
+              <a:schemeClr val="dk1"/>
+            </a:effectRef>
+            <a:fontRef idx="minor">
+              <a:schemeClr val="lt1"/>
+            </a:fontRef>
+          </p:style>
+          <p:txBody>
+            <a:bodyPr rtlCol="0" anchor="ctr"/>
+            <a:lstStyle/>
+            <a:p>
+              <a:pPr algn="ctr"/>
+              <a:r>
+                <a:rPr lang="en-US" sz="1200" dirty="0" smtClean="0"/>
+                <a:t>x86</a:t>
+              </a:r>
+              <a:endParaRPr lang="en-US" sz="1200" dirty="0"/>
+            </a:p>
+          </p:txBody>
+        </p:sp>
+        <p:sp>
+          <p:nvSpPr>
+            <p:cNvPr id="5" name="Rounded Rectangle 4"/>
+            <p:cNvSpPr/>
+            <p:nvPr/>
+          </p:nvSpPr>
+          <p:spPr>
+            <a:xfrm>
+              <a:off x="687824" y="1084332"/>
+              <a:ext cx="1848693" cy="574734"/>
+            </a:xfrm>
+            <a:prstGeom prst="roundRect">
+              <a:avLst/>
+            </a:prstGeom>
+          </p:spPr>
+          <p:style>
+            <a:lnRef idx="0">
+              <a:schemeClr val="accent2"/>
+            </a:lnRef>
+            <a:fillRef idx="3">
+              <a:schemeClr val="accent2"/>
+            </a:fillRef>
+            <a:effectRef idx="3">
+              <a:schemeClr val="accent2"/>
+            </a:effectRef>
+            <a:fontRef idx="minor">
+              <a:schemeClr val="lt1"/>
+            </a:fontRef>
+          </p:style>
+          <p:txBody>
+            <a:bodyPr rtlCol="0" anchor="t"/>
+            <a:lstStyle/>
+            <a:p>
+              <a:pPr algn="ctr"/>
+              <a:r>
+                <a:rPr lang="en-US" sz="1600" dirty="0" smtClean="0"/>
+                <a:t>C standard libraries</a:t>
+              </a:r>
+              <a:endParaRPr lang="en-US" sz="1600" dirty="0"/>
+            </a:p>
+          </p:txBody>
+        </p:sp>
+        <p:sp>
+          <p:nvSpPr>
+            <p:cNvPr id="6" name="Rounded Rectangle 5"/>
+            <p:cNvSpPr/>
+            <p:nvPr/>
+          </p:nvSpPr>
+          <p:spPr>
+            <a:xfrm>
+              <a:off x="1037635" y="1445252"/>
+              <a:ext cx="1149070" cy="210392"/>
+            </a:xfrm>
+            <a:prstGeom prst="roundRect">
+              <a:avLst/>
+            </a:prstGeom>
+          </p:spPr>
+          <p:style>
+            <a:lnRef idx="0">
+              <a:schemeClr val="dk1"/>
+            </a:lnRef>
+            <a:fillRef idx="3">
+              <a:schemeClr val="dk1"/>
+            </a:fillRef>
+            <a:effectRef idx="3">
+              <a:schemeClr val="dk1"/>
+            </a:effectRef>
+            <a:fontRef idx="minor">
+              <a:schemeClr val="lt1"/>
+            </a:fontRef>
+          </p:style>
+          <p:txBody>
+            <a:bodyPr rtlCol="0" anchor="ctr"/>
+            <a:lstStyle/>
+            <a:p>
+              <a:pPr algn="ctr"/>
+              <a:r>
+                <a:rPr lang="en-US" sz="1200" dirty="0" smtClean="0"/>
+                <a:t>x86</a:t>
+              </a:r>
+              <a:endParaRPr lang="en-US" sz="1200" dirty="0"/>
+            </a:p>
+          </p:txBody>
+        </p:sp>
+        <p:cxnSp>
+          <p:nvCxnSpPr>
+            <p:cNvPr id="7" name="Straight Arrow Connector 6"/>
+            <p:cNvCxnSpPr>
+              <a:stCxn id="5" idx="3"/>
+              <a:endCxn id="3" idx="1"/>
+            </p:cNvCxnSpPr>
+            <p:nvPr/>
+          </p:nvCxnSpPr>
+          <p:spPr>
+            <a:xfrm>
+              <a:off x="2536517" y="1371699"/>
+              <a:ext cx="514180" cy="4848"/>
+            </a:xfrm>
+            <a:prstGeom prst="straightConnector1">
+              <a:avLst/>
+            </a:prstGeom>
+            <a:ln w="57150">
+              <a:tailEnd type="triangle"/>
+            </a:ln>
+          </p:spPr>
+          <p:style>
+            <a:lnRef idx="3">
+              <a:schemeClr val="accent2"/>
+            </a:lnRef>
+            <a:fillRef idx="0">
+              <a:schemeClr val="accent2"/>
+            </a:fillRef>
+            <a:effectRef idx="2">
+              <a:schemeClr val="accent2"/>
+            </a:effectRef>
+            <a:fontRef idx="minor">
+              <a:schemeClr val="tx1"/>
+            </a:fontRef>
+          </p:style>
+        </p:cxnSp>
+        <p:cxnSp>
+          <p:nvCxnSpPr>
+            <p:cNvPr id="13" name="Straight Arrow Connector 12"/>
+            <p:cNvCxnSpPr>
+              <a:stCxn id="2" idx="2"/>
+              <a:endCxn id="3" idx="0"/>
+            </p:cNvCxnSpPr>
+            <p:nvPr/>
+          </p:nvCxnSpPr>
+          <p:spPr>
+            <a:xfrm>
+              <a:off x="4049388" y="489536"/>
+              <a:ext cx="2" cy="475018"/>
+            </a:xfrm>
+            <a:prstGeom prst="straightConnector1">
+              <a:avLst/>
+            </a:prstGeom>
+            <a:ln w="57150">
+              <a:tailEnd type="triangle"/>
+            </a:ln>
+          </p:spPr>
+          <p:style>
+            <a:lnRef idx="3">
+              <a:schemeClr val="accent3"/>
+            </a:lnRef>
+            <a:fillRef idx="0">
+              <a:schemeClr val="accent3"/>
+            </a:fillRef>
+            <a:effectRef idx="2">
+              <a:schemeClr val="accent3"/>
+            </a:effectRef>
+            <a:fontRef idx="minor">
+              <a:schemeClr val="tx1"/>
+            </a:fontRef>
+          </p:style>
+        </p:cxnSp>
+        <p:sp>
+          <p:nvSpPr>
+            <p:cNvPr id="17" name="Rounded Rectangle 16"/>
+            <p:cNvSpPr/>
+            <p:nvPr/>
+          </p:nvSpPr>
+          <p:spPr>
+            <a:xfrm>
+              <a:off x="5562261" y="1096470"/>
+              <a:ext cx="1604006" cy="550458"/>
+            </a:xfrm>
+            <a:prstGeom prst="roundRect">
+              <a:avLst/>
+            </a:prstGeom>
+          </p:spPr>
+          <p:style>
+            <a:lnRef idx="0">
+              <a:schemeClr val="accent5"/>
+            </a:lnRef>
+            <a:fillRef idx="3">
+              <a:schemeClr val="accent5"/>
+            </a:fillRef>
+            <a:effectRef idx="3">
+              <a:schemeClr val="accent5"/>
+            </a:effectRef>
+            <a:fontRef idx="minor">
+              <a:schemeClr val="lt1"/>
+            </a:fontRef>
+          </p:style>
+          <p:txBody>
+            <a:bodyPr rtlCol="0" anchor="t"/>
+            <a:lstStyle/>
+            <a:p>
+              <a:pPr algn="ctr"/>
+              <a:r>
+                <a:rPr lang="en-US" sz="1600" dirty="0" err="1" smtClean="0"/>
+                <a:t>binutils</a:t>
+              </a:r>
+              <a:endParaRPr lang="en-US" sz="1600" dirty="0"/>
+            </a:p>
+          </p:txBody>
+        </p:sp>
+        <p:sp>
+          <p:nvSpPr>
+            <p:cNvPr id="18" name="Rounded Rectangle 17"/>
+            <p:cNvSpPr/>
+            <p:nvPr/>
+          </p:nvSpPr>
+          <p:spPr>
+            <a:xfrm>
+              <a:off x="5769120" y="1436536"/>
+              <a:ext cx="1210627" cy="210392"/>
+            </a:xfrm>
+            <a:prstGeom prst="roundRect">
+              <a:avLst/>
+            </a:prstGeom>
+          </p:spPr>
+          <p:style>
+            <a:lnRef idx="0">
+              <a:schemeClr val="dk1"/>
+            </a:lnRef>
+            <a:fillRef idx="3">
+              <a:schemeClr val="dk1"/>
+            </a:fillRef>
+            <a:effectRef idx="3">
+              <a:schemeClr val="dk1"/>
+            </a:effectRef>
+            <a:fontRef idx="minor">
+              <a:schemeClr val="lt1"/>
+            </a:fontRef>
+          </p:style>
+          <p:txBody>
+            <a:bodyPr rtlCol="0" anchor="ctr"/>
+            <a:lstStyle/>
+            <a:p>
+              <a:pPr algn="ctr"/>
+              <a:r>
+                <a:rPr lang="en-US" sz="1200" dirty="0" smtClean="0"/>
+                <a:t>x86</a:t>
+              </a:r>
+              <a:endParaRPr lang="en-US" sz="1200" dirty="0"/>
+            </a:p>
+          </p:txBody>
+        </p:sp>
+        <p:cxnSp>
+          <p:nvCxnSpPr>
+            <p:cNvPr id="20" name="Straight Arrow Connector 19"/>
+            <p:cNvCxnSpPr>
+              <a:stCxn id="3" idx="3"/>
+              <a:endCxn id="17" idx="1"/>
+            </p:cNvCxnSpPr>
+            <p:nvPr/>
+          </p:nvCxnSpPr>
+          <p:spPr>
+            <a:xfrm flipV="1">
+              <a:off x="5048082" y="1371699"/>
+              <a:ext cx="514179" cy="4848"/>
+            </a:xfrm>
+            <a:prstGeom prst="straightConnector1">
+              <a:avLst/>
+            </a:prstGeom>
+            <a:ln w="57150">
+              <a:tailEnd type="triangle"/>
+            </a:ln>
+          </p:spPr>
+          <p:style>
+            <a:lnRef idx="3">
+              <a:schemeClr val="accent6"/>
+            </a:lnRef>
+            <a:fillRef idx="0">
+              <a:schemeClr val="accent6"/>
+            </a:fillRef>
+            <a:effectRef idx="2">
+              <a:schemeClr val="accent6"/>
+            </a:effectRef>
+            <a:fontRef idx="minor">
+              <a:schemeClr val="tx1"/>
+            </a:fontRef>
+          </p:style>
+        </p:cxnSp>
+        <p:sp>
+          <p:nvSpPr>
+            <p:cNvPr id="8" name="TextBox 7"/>
+            <p:cNvSpPr txBox="1"/>
+            <p:nvPr/>
+          </p:nvSpPr>
+          <p:spPr>
+            <a:xfrm>
+              <a:off x="1506467" y="211375"/>
+              <a:ext cx="593432" cy="461665"/>
+            </a:xfrm>
+            <a:prstGeom prst="rect">
+              <a:avLst/>
+            </a:prstGeom>
+            <a:noFill/>
+          </p:spPr>
+          <p:txBody>
+            <a:bodyPr wrap="none" rtlCol="0">
+              <a:spAutoFit/>
+            </a:bodyPr>
+            <a:lstStyle/>
+            <a:p>
+              <a:r>
+                <a:rPr lang="en-US" sz="2400" dirty="0" smtClean="0">
+                  <a:solidFill>
+                    <a:srgbClr val="FF0000"/>
+                  </a:solidFill>
+                </a:rPr>
+                <a:t>❶</a:t>
+              </a:r>
+              <a:endParaRPr lang="en-US" sz="2400" dirty="0">
+                <a:solidFill>
+                  <a:srgbClr val="FF0000"/>
+                </a:solidFill>
+              </a:endParaRPr>
+            </a:p>
+          </p:txBody>
+        </p:sp>
+      </p:grpSp>
+      <p:grpSp>
+        <p:nvGrpSpPr>
+          <p:cNvPr id="10" name="Group 9"/>
+          <p:cNvGrpSpPr/>
+          <p:nvPr/>
+        </p:nvGrpSpPr>
+        <p:grpSpPr>
+          <a:xfrm>
+            <a:off x="687824" y="2485879"/>
+            <a:ext cx="6829677" cy="1548279"/>
+            <a:chOff x="687824" y="2485879"/>
+            <a:chExt cx="6829677" cy="1548279"/>
+          </a:xfrm>
+        </p:grpSpPr>
+        <p:sp>
+          <p:nvSpPr>
+            <p:cNvPr id="38" name="Rounded Rectangle 37"/>
+            <p:cNvSpPr/>
+            <p:nvPr/>
+          </p:nvSpPr>
+          <p:spPr>
+            <a:xfrm>
+              <a:off x="3019337" y="2485879"/>
+              <a:ext cx="2060099" cy="315589"/>
+            </a:xfrm>
+            <a:prstGeom prst="roundRect">
+              <a:avLst/>
+            </a:prstGeom>
+          </p:spPr>
+          <p:style>
+            <a:lnRef idx="0">
+              <a:schemeClr val="accent3"/>
+            </a:lnRef>
+            <a:fillRef idx="3">
+              <a:schemeClr val="accent3"/>
+            </a:fillRef>
+            <a:effectRef idx="3">
+              <a:schemeClr val="accent3"/>
+            </a:effectRef>
+            <a:fontRef idx="minor">
+              <a:schemeClr val="lt1"/>
+            </a:fontRef>
+          </p:style>
+          <p:txBody>
+            <a:bodyPr rtlCol="0" anchor="ctr"/>
+            <a:lstStyle/>
+            <a:p>
+              <a:pPr algn="ctr"/>
+              <a:r>
+                <a:rPr lang="en-US" sz="1600" dirty="0" smtClean="0"/>
+                <a:t>Cross-compiler source</a:t>
+              </a:r>
+              <a:endParaRPr lang="en-US" sz="1600" dirty="0"/>
+            </a:p>
+          </p:txBody>
+        </p:sp>
+        <p:sp>
+          <p:nvSpPr>
+            <p:cNvPr id="39" name="Rounded Rectangle 38"/>
+            <p:cNvSpPr/>
+            <p:nvPr/>
+          </p:nvSpPr>
+          <p:spPr>
+            <a:xfrm>
+              <a:off x="3050697" y="3210172"/>
+              <a:ext cx="1997385" cy="823986"/>
+            </a:xfrm>
+            <a:prstGeom prst="roundRect">
+              <a:avLst/>
+            </a:prstGeom>
+          </p:spPr>
+          <p:style>
+            <a:lnRef idx="0">
+              <a:schemeClr val="accent6"/>
+            </a:lnRef>
+            <a:fillRef idx="3">
+              <a:schemeClr val="accent6"/>
+            </a:fillRef>
+            <a:effectRef idx="3">
+              <a:schemeClr val="accent6"/>
+            </a:effectRef>
+            <a:fontRef idx="minor">
+              <a:schemeClr val="lt1"/>
+            </a:fontRef>
+          </p:style>
+          <p:txBody>
+            <a:bodyPr rtlCol="0" anchor="t"/>
+            <a:lstStyle/>
+            <a:p>
+              <a:pPr algn="ctr"/>
+              <a:r>
+                <a:rPr lang="en-US" sz="1600" dirty="0" smtClean="0"/>
+                <a:t>Compiler, assembler and linker</a:t>
+              </a:r>
+              <a:endParaRPr lang="en-US" sz="1600" dirty="0"/>
+            </a:p>
+          </p:txBody>
+        </p:sp>
+        <p:sp>
+          <p:nvSpPr>
+            <p:cNvPr id="40" name="Rounded Rectangle 39"/>
+            <p:cNvSpPr/>
+            <p:nvPr/>
+          </p:nvSpPr>
+          <p:spPr>
+            <a:xfrm>
+              <a:off x="3444075" y="3820343"/>
+              <a:ext cx="1210627" cy="210392"/>
+            </a:xfrm>
+            <a:prstGeom prst="roundRect">
+              <a:avLst/>
+            </a:prstGeom>
+          </p:spPr>
+          <p:style>
+            <a:lnRef idx="0">
+              <a:schemeClr val="dk1"/>
+            </a:lnRef>
+            <a:fillRef idx="3">
+              <a:schemeClr val="dk1"/>
+            </a:fillRef>
+            <a:effectRef idx="3">
+              <a:schemeClr val="dk1"/>
+            </a:effectRef>
+            <a:fontRef idx="minor">
+              <a:schemeClr val="lt1"/>
+            </a:fontRef>
+          </p:style>
+          <p:txBody>
+            <a:bodyPr rtlCol="0" anchor="ctr"/>
+            <a:lstStyle/>
+            <a:p>
+              <a:pPr algn="ctr"/>
+              <a:r>
+                <a:rPr lang="en-US" sz="1200" dirty="0" smtClean="0"/>
+                <a:t>x86</a:t>
+              </a:r>
+              <a:endParaRPr lang="en-US" sz="1200" dirty="0"/>
+            </a:p>
+          </p:txBody>
+        </p:sp>
+        <p:sp>
+          <p:nvSpPr>
+            <p:cNvPr id="41" name="Rounded Rectangle 40"/>
+            <p:cNvSpPr/>
+            <p:nvPr/>
+          </p:nvSpPr>
+          <p:spPr>
+            <a:xfrm>
+              <a:off x="687824" y="3329950"/>
+              <a:ext cx="1848693" cy="574734"/>
+            </a:xfrm>
+            <a:prstGeom prst="roundRect">
+              <a:avLst/>
+            </a:prstGeom>
+          </p:spPr>
+          <p:style>
+            <a:lnRef idx="0">
+              <a:schemeClr val="accent2"/>
+            </a:lnRef>
+            <a:fillRef idx="3">
+              <a:schemeClr val="accent2"/>
+            </a:fillRef>
+            <a:effectRef idx="3">
+              <a:schemeClr val="accent2"/>
+            </a:effectRef>
+            <a:fontRef idx="minor">
+              <a:schemeClr val="lt1"/>
+            </a:fontRef>
+          </p:style>
+          <p:txBody>
+            <a:bodyPr rtlCol="0" anchor="t"/>
+            <a:lstStyle/>
+            <a:p>
+              <a:pPr algn="ctr"/>
+              <a:r>
+                <a:rPr lang="en-US" sz="1600" dirty="0" smtClean="0"/>
+                <a:t>C standard libraries</a:t>
+              </a:r>
+              <a:endParaRPr lang="en-US" sz="1600" dirty="0"/>
+            </a:p>
+          </p:txBody>
+        </p:sp>
+        <p:sp>
+          <p:nvSpPr>
+            <p:cNvPr id="42" name="Rounded Rectangle 41"/>
+            <p:cNvSpPr/>
+            <p:nvPr/>
+          </p:nvSpPr>
+          <p:spPr>
+            <a:xfrm>
+              <a:off x="1037635" y="3690870"/>
+              <a:ext cx="1149070" cy="210392"/>
+            </a:xfrm>
+            <a:prstGeom prst="roundRect">
+              <a:avLst/>
+            </a:prstGeom>
+          </p:spPr>
+          <p:style>
+            <a:lnRef idx="0">
+              <a:schemeClr val="dk1"/>
+            </a:lnRef>
+            <a:fillRef idx="3">
+              <a:schemeClr val="dk1"/>
+            </a:fillRef>
+            <a:effectRef idx="3">
+              <a:schemeClr val="dk1"/>
+            </a:effectRef>
+            <a:fontRef idx="minor">
+              <a:schemeClr val="lt1"/>
+            </a:fontRef>
+          </p:style>
+          <p:txBody>
+            <a:bodyPr rtlCol="0" anchor="ctr"/>
+            <a:lstStyle/>
+            <a:p>
+              <a:pPr algn="ctr"/>
+              <a:r>
+                <a:rPr lang="en-US" sz="1200" dirty="0" smtClean="0"/>
+                <a:t>x86</a:t>
+              </a:r>
+              <a:endParaRPr lang="en-US" sz="1200" dirty="0"/>
+            </a:p>
+          </p:txBody>
+        </p:sp>
+        <p:cxnSp>
+          <p:nvCxnSpPr>
+            <p:cNvPr id="43" name="Straight Arrow Connector 42"/>
+            <p:cNvCxnSpPr>
+              <a:stCxn id="41" idx="3"/>
+              <a:endCxn id="39" idx="1"/>
+            </p:cNvCxnSpPr>
+            <p:nvPr/>
+          </p:nvCxnSpPr>
+          <p:spPr>
+            <a:xfrm>
+              <a:off x="2536517" y="3617317"/>
+              <a:ext cx="514180" cy="4848"/>
+            </a:xfrm>
+            <a:prstGeom prst="straightConnector1">
+              <a:avLst/>
+            </a:prstGeom>
+            <a:ln w="57150">
+              <a:tailEnd type="triangle"/>
+            </a:ln>
+          </p:spPr>
+          <p:style>
+            <a:lnRef idx="3">
+              <a:schemeClr val="accent2"/>
+            </a:lnRef>
+            <a:fillRef idx="0">
+              <a:schemeClr val="accent2"/>
+            </a:fillRef>
+            <a:effectRef idx="2">
+              <a:schemeClr val="accent2"/>
+            </a:effectRef>
+            <a:fontRef idx="minor">
+              <a:schemeClr val="tx1"/>
+            </a:fontRef>
+          </p:style>
+        </p:cxnSp>
+        <p:cxnSp>
+          <p:nvCxnSpPr>
+            <p:cNvPr id="44" name="Straight Arrow Connector 43"/>
+            <p:cNvCxnSpPr>
+              <a:stCxn id="38" idx="2"/>
+              <a:endCxn id="39" idx="0"/>
+            </p:cNvCxnSpPr>
+            <p:nvPr/>
+          </p:nvCxnSpPr>
+          <p:spPr>
+            <a:xfrm>
+              <a:off x="4049387" y="2801468"/>
+              <a:ext cx="3" cy="408704"/>
+            </a:xfrm>
+            <a:prstGeom prst="straightConnector1">
+              <a:avLst/>
+            </a:prstGeom>
+            <a:ln w="57150">
+              <a:tailEnd type="triangle"/>
+            </a:ln>
+          </p:spPr>
+          <p:style>
+            <a:lnRef idx="3">
+              <a:schemeClr val="accent3"/>
+            </a:lnRef>
+            <a:fillRef idx="0">
+              <a:schemeClr val="accent3"/>
+            </a:fillRef>
+            <a:effectRef idx="2">
+              <a:schemeClr val="accent3"/>
+            </a:effectRef>
+            <a:fontRef idx="minor">
+              <a:schemeClr val="tx1"/>
+            </a:fontRef>
+          </p:style>
+        </p:cxnSp>
+        <p:sp>
+          <p:nvSpPr>
+            <p:cNvPr id="45" name="Rounded Rectangle 44"/>
+            <p:cNvSpPr/>
+            <p:nvPr/>
+          </p:nvSpPr>
+          <p:spPr>
+            <a:xfrm>
+              <a:off x="5562261" y="3342088"/>
+              <a:ext cx="1955240" cy="550458"/>
+            </a:xfrm>
+            <a:prstGeom prst="roundRect">
+              <a:avLst/>
+            </a:prstGeom>
+          </p:spPr>
+          <p:style>
+            <a:lnRef idx="0">
+              <a:schemeClr val="accent5"/>
+            </a:lnRef>
+            <a:fillRef idx="3">
+              <a:schemeClr val="accent5"/>
+            </a:fillRef>
+            <a:effectRef idx="3">
+              <a:schemeClr val="accent5"/>
+            </a:effectRef>
+            <a:fontRef idx="minor">
+              <a:schemeClr val="lt1"/>
+            </a:fontRef>
+          </p:style>
+          <p:txBody>
+            <a:bodyPr rtlCol="0" anchor="t"/>
+            <a:lstStyle/>
+            <a:p>
+              <a:pPr algn="ctr"/>
+              <a:r>
+                <a:rPr lang="en-US" sz="1600" dirty="0" smtClean="0"/>
+                <a:t>Bootstrap compiler</a:t>
+              </a:r>
+              <a:endParaRPr lang="en-US" sz="1600" dirty="0"/>
+            </a:p>
+          </p:txBody>
+        </p:sp>
+        <p:sp>
+          <p:nvSpPr>
+            <p:cNvPr id="46" name="Rounded Rectangle 45"/>
+            <p:cNvSpPr/>
+            <p:nvPr/>
+          </p:nvSpPr>
+          <p:spPr>
+            <a:xfrm>
+              <a:off x="5912074" y="3682154"/>
+              <a:ext cx="1210627" cy="210392"/>
+            </a:xfrm>
+            <a:prstGeom prst="roundRect">
+              <a:avLst/>
+            </a:prstGeom>
+          </p:spPr>
+          <p:style>
+            <a:lnRef idx="0">
+              <a:schemeClr val="dk1"/>
+            </a:lnRef>
+            <a:fillRef idx="3">
+              <a:schemeClr val="dk1"/>
+            </a:fillRef>
+            <a:effectRef idx="3">
+              <a:schemeClr val="dk1"/>
+            </a:effectRef>
+            <a:fontRef idx="minor">
+              <a:schemeClr val="lt1"/>
+            </a:fontRef>
+          </p:style>
+          <p:txBody>
+            <a:bodyPr rtlCol="0" anchor="ctr"/>
+            <a:lstStyle/>
+            <a:p>
+              <a:pPr algn="ctr"/>
+              <a:r>
+                <a:rPr lang="en-US" sz="1200" dirty="0" smtClean="0"/>
+                <a:t>x86</a:t>
+              </a:r>
+              <a:endParaRPr lang="en-US" sz="1200" dirty="0"/>
+            </a:p>
+          </p:txBody>
+        </p:sp>
+        <p:cxnSp>
+          <p:nvCxnSpPr>
+            <p:cNvPr id="47" name="Straight Arrow Connector 46"/>
+            <p:cNvCxnSpPr>
+              <a:stCxn id="39" idx="3"/>
+              <a:endCxn id="45" idx="1"/>
+            </p:cNvCxnSpPr>
+            <p:nvPr/>
+          </p:nvCxnSpPr>
+          <p:spPr>
+            <a:xfrm flipV="1">
+              <a:off x="5048082" y="3617317"/>
+              <a:ext cx="514179" cy="4848"/>
+            </a:xfrm>
+            <a:prstGeom prst="straightConnector1">
+              <a:avLst/>
+            </a:prstGeom>
+            <a:ln w="57150">
+              <a:tailEnd type="triangle"/>
+            </a:ln>
+          </p:spPr>
+          <p:style>
+            <a:lnRef idx="3">
+              <a:schemeClr val="accent6"/>
+            </a:lnRef>
+            <a:fillRef idx="0">
+              <a:schemeClr val="accent6"/>
+            </a:fillRef>
+            <a:effectRef idx="2">
+              <a:schemeClr val="accent6"/>
+            </a:effectRef>
+            <a:fontRef idx="minor">
+              <a:schemeClr val="tx1"/>
+            </a:fontRef>
+          </p:style>
+        </p:cxnSp>
+        <p:sp>
+          <p:nvSpPr>
+            <p:cNvPr id="32" name="TextBox 31"/>
+            <p:cNvSpPr txBox="1"/>
+            <p:nvPr/>
+          </p:nvSpPr>
+          <p:spPr>
+            <a:xfrm>
+              <a:off x="1497025" y="2497321"/>
+              <a:ext cx="593432" cy="461665"/>
+            </a:xfrm>
+            <a:prstGeom prst="rect">
+              <a:avLst/>
+            </a:prstGeom>
+            <a:noFill/>
+          </p:spPr>
+          <p:txBody>
+            <a:bodyPr wrap="none" rtlCol="0">
+              <a:spAutoFit/>
+            </a:bodyPr>
+            <a:lstStyle/>
+            <a:p>
+              <a:r>
+                <a:rPr lang="en-US" sz="2400" dirty="0" smtClean="0">
+                  <a:solidFill>
+                    <a:srgbClr val="FF0000"/>
+                  </a:solidFill>
+                </a:rPr>
+                <a:t>❷</a:t>
+              </a:r>
+              <a:endParaRPr lang="en-US" sz="2400" dirty="0">
+                <a:solidFill>
+                  <a:srgbClr val="FF0000"/>
+                </a:solidFill>
+              </a:endParaRPr>
+            </a:p>
+          </p:txBody>
+        </p:sp>
+      </p:grpSp>
+      <p:grpSp>
+        <p:nvGrpSpPr>
+          <p:cNvPr id="11" name="Group 10"/>
+          <p:cNvGrpSpPr/>
+          <p:nvPr/>
+        </p:nvGrpSpPr>
+        <p:grpSpPr>
+          <a:xfrm>
+            <a:off x="476418" y="4708395"/>
+            <a:ext cx="7083228" cy="1301471"/>
+            <a:chOff x="476418" y="4708395"/>
+            <a:chExt cx="7083228" cy="1301471"/>
+          </a:xfrm>
+        </p:grpSpPr>
+        <p:sp>
+          <p:nvSpPr>
+            <p:cNvPr id="57" name="Rounded Rectangle 56"/>
+            <p:cNvSpPr/>
+            <p:nvPr/>
+          </p:nvSpPr>
+          <p:spPr>
+            <a:xfrm>
+              <a:off x="3050691" y="4708395"/>
+              <a:ext cx="2060099" cy="315589"/>
+            </a:xfrm>
+            <a:prstGeom prst="roundRect">
+              <a:avLst/>
+            </a:prstGeom>
+          </p:spPr>
+          <p:style>
+            <a:lnRef idx="0">
+              <a:schemeClr val="accent3"/>
+            </a:lnRef>
+            <a:fillRef idx="3">
+              <a:schemeClr val="accent3"/>
+            </a:fillRef>
+            <a:effectRef idx="3">
+              <a:schemeClr val="accent3"/>
+            </a:effectRef>
+            <a:fontRef idx="minor">
+              <a:schemeClr val="lt1"/>
+            </a:fontRef>
+          </p:style>
+          <p:txBody>
+            <a:bodyPr rtlCol="0" anchor="ctr"/>
+            <a:lstStyle/>
+            <a:p>
+              <a:pPr algn="ctr"/>
+              <a:r>
+                <a:rPr lang="en-US" sz="1600" dirty="0" smtClean="0"/>
+                <a:t>C library source</a:t>
+              </a:r>
+              <a:endParaRPr lang="en-US" sz="1600" dirty="0"/>
+            </a:p>
+          </p:txBody>
+        </p:sp>
+        <p:sp>
+          <p:nvSpPr>
+            <p:cNvPr id="58" name="Rounded Rectangle 57"/>
+            <p:cNvSpPr/>
+            <p:nvPr/>
+          </p:nvSpPr>
+          <p:spPr>
+            <a:xfrm>
+              <a:off x="3082051" y="5432688"/>
+              <a:ext cx="1997385" cy="571859"/>
+            </a:xfrm>
+            <a:prstGeom prst="roundRect">
+              <a:avLst/>
+            </a:prstGeom>
+          </p:spPr>
+          <p:style>
+            <a:lnRef idx="0">
+              <a:schemeClr val="accent5"/>
+            </a:lnRef>
+            <a:fillRef idx="3">
+              <a:schemeClr val="accent5"/>
+            </a:fillRef>
+            <a:effectRef idx="3">
+              <a:schemeClr val="accent5"/>
+            </a:effectRef>
+            <a:fontRef idx="minor">
+              <a:schemeClr val="lt1"/>
+            </a:fontRef>
+          </p:style>
+          <p:txBody>
+            <a:bodyPr rtlCol="0" anchor="t"/>
+            <a:lstStyle/>
+            <a:p>
+              <a:pPr algn="ctr"/>
+              <a:r>
+                <a:rPr lang="en-US" sz="1600" dirty="0" smtClean="0"/>
+                <a:t>Bootstrap compiler</a:t>
+              </a:r>
+              <a:endParaRPr lang="en-US" sz="1600" dirty="0"/>
+            </a:p>
+          </p:txBody>
+        </p:sp>
+        <p:sp>
+          <p:nvSpPr>
+            <p:cNvPr id="59" name="Rounded Rectangle 58"/>
+            <p:cNvSpPr/>
+            <p:nvPr/>
+          </p:nvSpPr>
+          <p:spPr>
+            <a:xfrm>
+              <a:off x="3475430" y="5799474"/>
+              <a:ext cx="1210627" cy="210392"/>
+            </a:xfrm>
+            <a:prstGeom prst="roundRect">
+              <a:avLst/>
+            </a:prstGeom>
+          </p:spPr>
+          <p:style>
+            <a:lnRef idx="0">
+              <a:schemeClr val="dk1"/>
+            </a:lnRef>
+            <a:fillRef idx="3">
+              <a:schemeClr val="dk1"/>
+            </a:fillRef>
+            <a:effectRef idx="3">
+              <a:schemeClr val="dk1"/>
+            </a:effectRef>
+            <a:fontRef idx="minor">
+              <a:schemeClr val="lt1"/>
+            </a:fontRef>
+          </p:style>
+          <p:txBody>
+            <a:bodyPr rtlCol="0" anchor="ctr"/>
+            <a:lstStyle/>
+            <a:p>
+              <a:pPr algn="ctr"/>
+              <a:r>
+                <a:rPr lang="en-US" sz="1200" dirty="0" smtClean="0"/>
+                <a:t>x86</a:t>
+              </a:r>
+              <a:endParaRPr lang="en-US" sz="1200" dirty="0"/>
+            </a:p>
+          </p:txBody>
+        </p:sp>
+        <p:cxnSp>
+          <p:nvCxnSpPr>
+            <p:cNvPr id="63" name="Straight Arrow Connector 62"/>
+            <p:cNvCxnSpPr>
+              <a:stCxn id="57" idx="2"/>
+              <a:endCxn id="58" idx="0"/>
+            </p:cNvCxnSpPr>
+            <p:nvPr/>
+          </p:nvCxnSpPr>
+          <p:spPr>
+            <a:xfrm>
+              <a:off x="4080741" y="5023984"/>
+              <a:ext cx="3" cy="408704"/>
+            </a:xfrm>
+            <a:prstGeom prst="straightConnector1">
+              <a:avLst/>
+            </a:prstGeom>
+            <a:ln w="57150">
+              <a:tailEnd type="triangle"/>
+            </a:ln>
+          </p:spPr>
+          <p:style>
+            <a:lnRef idx="3">
+              <a:schemeClr val="accent3"/>
+            </a:lnRef>
+            <a:fillRef idx="0">
+              <a:schemeClr val="accent3"/>
+            </a:fillRef>
+            <a:effectRef idx="2">
+              <a:schemeClr val="accent3"/>
+            </a:effectRef>
+            <a:fontRef idx="minor">
+              <a:schemeClr val="tx1"/>
+            </a:fontRef>
+          </p:style>
+        </p:cxnSp>
+        <p:sp>
+          <p:nvSpPr>
+            <p:cNvPr id="75" name="Rounded Rectangle 74"/>
+            <p:cNvSpPr/>
+            <p:nvPr/>
+          </p:nvSpPr>
+          <p:spPr>
+            <a:xfrm>
+              <a:off x="5562261" y="5432688"/>
+              <a:ext cx="1997385" cy="571859"/>
+            </a:xfrm>
+            <a:prstGeom prst="roundRect">
+              <a:avLst/>
+            </a:prstGeom>
+          </p:spPr>
+          <p:style>
+            <a:lnRef idx="0">
+              <a:schemeClr val="accent2"/>
+            </a:lnRef>
+            <a:fillRef idx="3">
+              <a:schemeClr val="accent2"/>
+            </a:fillRef>
+            <a:effectRef idx="3">
+              <a:schemeClr val="accent2"/>
+            </a:effectRef>
+            <a:fontRef idx="minor">
+              <a:schemeClr val="lt1"/>
+            </a:fontRef>
+          </p:style>
+          <p:txBody>
+            <a:bodyPr rtlCol="0" anchor="t"/>
+            <a:lstStyle/>
+            <a:p>
+              <a:pPr algn="ctr"/>
+              <a:r>
+                <a:rPr lang="en-US" sz="1600" dirty="0" err="1" smtClean="0"/>
+                <a:t>glibc</a:t>
+              </a:r>
+              <a:r>
+                <a:rPr lang="en-US" sz="1600" dirty="0" smtClean="0"/>
+                <a:t> or </a:t>
+              </a:r>
+              <a:r>
+                <a:rPr lang="en-US" sz="1600" dirty="0" err="1" smtClean="0"/>
+                <a:t>uClibc</a:t>
+              </a:r>
+              <a:endParaRPr lang="en-US" sz="1600" dirty="0"/>
+            </a:p>
+          </p:txBody>
+        </p:sp>
+        <p:sp>
+          <p:nvSpPr>
+            <p:cNvPr id="76" name="Rounded Rectangle 75"/>
+            <p:cNvSpPr/>
+            <p:nvPr/>
+          </p:nvSpPr>
+          <p:spPr>
+            <a:xfrm>
+              <a:off x="5955640" y="5799474"/>
+              <a:ext cx="1210627" cy="210392"/>
+            </a:xfrm>
+            <a:prstGeom prst="roundRect">
+              <a:avLst/>
+            </a:prstGeom>
+          </p:spPr>
+          <p:style>
+            <a:lnRef idx="0">
+              <a:schemeClr val="dk1"/>
+            </a:lnRef>
+            <a:fillRef idx="3">
+              <a:schemeClr val="dk1"/>
+            </a:fillRef>
+            <a:effectRef idx="3">
+              <a:schemeClr val="dk1"/>
+            </a:effectRef>
+            <a:fontRef idx="minor">
+              <a:schemeClr val="lt1"/>
+            </a:fontRef>
+          </p:style>
+          <p:txBody>
+            <a:bodyPr rtlCol="0" anchor="ctr"/>
+            <a:lstStyle/>
+            <a:p>
+              <a:pPr algn="ctr"/>
+              <a:r>
+                <a:rPr lang="en-US" sz="1200" dirty="0" smtClean="0"/>
+                <a:t>ARM</a:t>
+              </a:r>
+              <a:endParaRPr lang="en-US" sz="1200" dirty="0"/>
+            </a:p>
+          </p:txBody>
+        </p:sp>
+        <p:cxnSp>
+          <p:nvCxnSpPr>
+            <p:cNvPr id="77" name="Straight Arrow Connector 76"/>
+            <p:cNvCxnSpPr>
+              <a:stCxn id="58" idx="3"/>
+              <a:endCxn id="75" idx="1"/>
+            </p:cNvCxnSpPr>
+            <p:nvPr/>
+          </p:nvCxnSpPr>
+          <p:spPr>
+            <a:xfrm>
+              <a:off x="5079436" y="5718618"/>
+              <a:ext cx="482825" cy="0"/>
+            </a:xfrm>
+            <a:prstGeom prst="straightConnector1">
+              <a:avLst/>
+            </a:prstGeom>
+            <a:ln w="57150">
+              <a:tailEnd type="triangle"/>
+            </a:ln>
+          </p:spPr>
+          <p:style>
+            <a:lnRef idx="3">
+              <a:schemeClr val="accent5"/>
+            </a:lnRef>
+            <a:fillRef idx="0">
+              <a:schemeClr val="accent5"/>
+            </a:fillRef>
+            <a:effectRef idx="2">
+              <a:schemeClr val="accent5"/>
+            </a:effectRef>
+            <a:fontRef idx="minor">
+              <a:schemeClr val="tx1"/>
+            </a:fontRef>
+          </p:style>
+        </p:cxnSp>
+        <p:sp>
+          <p:nvSpPr>
+            <p:cNvPr id="82" name="Rounded Rectangle 81"/>
+            <p:cNvSpPr/>
+            <p:nvPr/>
+          </p:nvSpPr>
+          <p:spPr>
+            <a:xfrm>
+              <a:off x="476418" y="5560822"/>
+              <a:ext cx="2060099" cy="315589"/>
+            </a:xfrm>
+            <a:prstGeom prst="roundRect">
+              <a:avLst/>
+            </a:prstGeom>
+          </p:spPr>
+          <p:style>
+            <a:lnRef idx="0">
+              <a:schemeClr val="accent3"/>
+            </a:lnRef>
+            <a:fillRef idx="3">
+              <a:schemeClr val="accent3"/>
+            </a:fillRef>
+            <a:effectRef idx="3">
+              <a:schemeClr val="accent3"/>
+            </a:effectRef>
+            <a:fontRef idx="minor">
+              <a:schemeClr val="lt1"/>
+            </a:fontRef>
+          </p:style>
+          <p:txBody>
+            <a:bodyPr rtlCol="0" anchor="ctr"/>
+            <a:lstStyle/>
+            <a:p>
+              <a:pPr algn="ctr"/>
+              <a:r>
+                <a:rPr lang="en-US" sz="1600" dirty="0" smtClean="0"/>
+                <a:t>Linux kernel headers</a:t>
+              </a:r>
+              <a:endParaRPr lang="en-US" sz="1600" dirty="0"/>
+            </a:p>
+          </p:txBody>
+        </p:sp>
+        <p:cxnSp>
+          <p:nvCxnSpPr>
+            <p:cNvPr id="83" name="Straight Arrow Connector 82"/>
+            <p:cNvCxnSpPr>
+              <a:stCxn id="82" idx="3"/>
+              <a:endCxn id="58" idx="1"/>
+            </p:cNvCxnSpPr>
+            <p:nvPr/>
+          </p:nvCxnSpPr>
+          <p:spPr>
+            <a:xfrm>
+              <a:off x="2536517" y="5718617"/>
+              <a:ext cx="545534" cy="1"/>
+            </a:xfrm>
+            <a:prstGeom prst="straightConnector1">
+              <a:avLst/>
+            </a:prstGeom>
+            <a:ln w="57150">
+              <a:tailEnd type="triangle"/>
+            </a:ln>
+          </p:spPr>
+          <p:style>
+            <a:lnRef idx="3">
+              <a:schemeClr val="accent3"/>
+            </a:lnRef>
+            <a:fillRef idx="0">
+              <a:schemeClr val="accent3"/>
+            </a:fillRef>
+            <a:effectRef idx="2">
+              <a:schemeClr val="accent3"/>
+            </a:effectRef>
+            <a:fontRef idx="minor">
+              <a:schemeClr val="tx1"/>
+            </a:fontRef>
+          </p:style>
+        </p:cxnSp>
+        <p:sp>
+          <p:nvSpPr>
+            <p:cNvPr id="33" name="TextBox 32"/>
+            <p:cNvSpPr txBox="1"/>
+            <p:nvPr/>
+          </p:nvSpPr>
+          <p:spPr>
+            <a:xfrm>
+              <a:off x="1506467" y="4749032"/>
+              <a:ext cx="593432" cy="461665"/>
+            </a:xfrm>
+            <a:prstGeom prst="rect">
+              <a:avLst/>
+            </a:prstGeom>
+            <a:noFill/>
+          </p:spPr>
+          <p:txBody>
+            <a:bodyPr wrap="none" rtlCol="0">
+              <a:spAutoFit/>
+            </a:bodyPr>
+            <a:lstStyle/>
+            <a:p>
+              <a:r>
+                <a:rPr lang="en-US" sz="2400" dirty="0" smtClean="0">
+                  <a:solidFill>
+                    <a:srgbClr val="FF0000"/>
+                  </a:solidFill>
+                </a:rPr>
+                <a:t>❸</a:t>
+              </a:r>
+              <a:endParaRPr lang="en-US" sz="2400" dirty="0">
+                <a:solidFill>
+                  <a:srgbClr val="FF0000"/>
+                </a:solidFill>
+              </a:endParaRPr>
+            </a:p>
+          </p:txBody>
+        </p:sp>
+      </p:grpSp>
+    </p:spTree>
+    <p:extLst>
+      <p:ext uri="{BB962C8B-B14F-4D97-AF65-F5344CB8AC3E}">
+        <p14:creationId xmlns:p14="http://schemas.microsoft.com/office/powerpoint/2010/main" val="1324575072"/>
+      </p:ext>
+    </p:extLst>
+  </p:cSld>
+  <p:clrMapOvr>
+    <a:masterClrMapping/>
+  </p:clrMapOvr>
+  <p:timing>
+    <p:tnLst>
+      <p:par>
+        <p:cTn id="1" dur="indefinite" restart="never" nodeType="tmRoot"/>
+      </p:par>
+    </p:tnLst>
+  </p:timing>
+</p:sld>
+</file>
+
+<file path=ppt/slides/slide4.xml><?xml version="1.0" encoding="utf-8"?>
+<p:sld xmlns:a="http://schemas.openxmlformats.org/drawingml/2006/main" xmlns:r="http://schemas.openxmlformats.org/officeDocument/2006/relationships" xmlns:p="http://schemas.openxmlformats.org/presentationml/2006/main">
+  <p:cSld>
+    <p:spTree>
+      <p:nvGrpSpPr>
+        <p:cNvPr id="1" name=""/>
+        <p:cNvGrpSpPr/>
+        <p:nvPr/>
+      </p:nvGrpSpPr>
+      <p:grpSpPr>
+        <a:xfrm>
+          <a:off x="0" y="0"/>
+          <a:ext cx="0" cy="0"/>
+          <a:chOff x="0" y="0"/>
+          <a:chExt cx="0" cy="0"/>
+        </a:xfrm>
+      </p:grpSpPr>
+      <p:grpSp>
+        <p:nvGrpSpPr>
+          <p:cNvPr id="2" name="Group 1"/>
+          <p:cNvGrpSpPr/>
+          <p:nvPr/>
+        </p:nvGrpSpPr>
+        <p:grpSpPr>
+          <a:xfrm>
+            <a:off x="927622" y="231645"/>
+            <a:ext cx="6820579" cy="1548359"/>
+            <a:chOff x="927622" y="231645"/>
+            <a:chExt cx="6820579" cy="1548359"/>
+          </a:xfrm>
+        </p:grpSpPr>
+        <p:sp>
+          <p:nvSpPr>
+            <p:cNvPr id="57" name="Rounded Rectangle 56"/>
+            <p:cNvSpPr/>
+            <p:nvPr/>
+          </p:nvSpPr>
+          <p:spPr>
+            <a:xfrm>
+              <a:off x="3250716" y="231645"/>
+              <a:ext cx="2060099" cy="315589"/>
+            </a:xfrm>
+            <a:prstGeom prst="roundRect">
+              <a:avLst/>
+            </a:prstGeom>
+          </p:spPr>
+          <p:style>
+            <a:lnRef idx="0">
+              <a:schemeClr val="accent3"/>
+            </a:lnRef>
+            <a:fillRef idx="3">
+              <a:schemeClr val="accent3"/>
+            </a:fillRef>
+            <a:effectRef idx="3">
+              <a:schemeClr val="accent3"/>
+            </a:effectRef>
+            <a:fontRef idx="minor">
+              <a:schemeClr val="lt1"/>
+            </a:fontRef>
+          </p:style>
+          <p:txBody>
+            <a:bodyPr rtlCol="0" anchor="ctr"/>
+            <a:lstStyle/>
+            <a:p>
+              <a:pPr algn="ctr"/>
+              <a:r>
+                <a:rPr lang="en-US" sz="1600" dirty="0" smtClean="0"/>
+                <a:t>Cross-compiler source</a:t>
+              </a:r>
+              <a:endParaRPr lang="en-US" sz="1600" dirty="0"/>
+            </a:p>
+          </p:txBody>
+        </p:sp>
+        <p:cxnSp>
+          <p:nvCxnSpPr>
+            <p:cNvPr id="63" name="Straight Arrow Connector 62"/>
+            <p:cNvCxnSpPr>
+              <a:stCxn id="57" idx="2"/>
+              <a:endCxn id="36" idx="0"/>
+            </p:cNvCxnSpPr>
+            <p:nvPr/>
+          </p:nvCxnSpPr>
+          <p:spPr>
+            <a:xfrm flipH="1">
+              <a:off x="4269301" y="547234"/>
+              <a:ext cx="11465" cy="408784"/>
+            </a:xfrm>
+            <a:prstGeom prst="straightConnector1">
+              <a:avLst/>
+            </a:prstGeom>
+            <a:ln w="57150">
+              <a:tailEnd type="triangle"/>
+            </a:ln>
+          </p:spPr>
+          <p:style>
+            <a:lnRef idx="3">
+              <a:schemeClr val="accent3"/>
+            </a:lnRef>
+            <a:fillRef idx="0">
+              <a:schemeClr val="accent3"/>
+            </a:fillRef>
+            <a:effectRef idx="2">
+              <a:schemeClr val="accent3"/>
+            </a:effectRef>
+            <a:fontRef idx="minor">
+              <a:schemeClr val="tx1"/>
+            </a:fontRef>
+          </p:style>
+        </p:cxnSp>
+        <p:sp>
+          <p:nvSpPr>
+            <p:cNvPr id="75" name="Rounded Rectangle 74"/>
+            <p:cNvSpPr/>
+            <p:nvPr/>
+          </p:nvSpPr>
+          <p:spPr>
+            <a:xfrm>
+              <a:off x="5750816" y="1082634"/>
+              <a:ext cx="1997385" cy="571859"/>
+            </a:xfrm>
+            <a:prstGeom prst="roundRect">
+              <a:avLst/>
+            </a:prstGeom>
+          </p:spPr>
+          <p:style>
+            <a:lnRef idx="0">
+              <a:schemeClr val="accent5"/>
+            </a:lnRef>
+            <a:fillRef idx="3">
+              <a:schemeClr val="accent5"/>
+            </a:fillRef>
+            <a:effectRef idx="3">
+              <a:schemeClr val="accent5"/>
+            </a:effectRef>
+            <a:fontRef idx="minor">
+              <a:schemeClr val="lt1"/>
+            </a:fontRef>
+          </p:style>
+          <p:txBody>
+            <a:bodyPr rtlCol="0" anchor="t"/>
+            <a:lstStyle/>
+            <a:p>
+              <a:pPr algn="ctr"/>
+              <a:r>
+                <a:rPr lang="en-US" sz="1600" dirty="0" smtClean="0"/>
+                <a:t>Cross-compiler</a:t>
+              </a:r>
+              <a:endParaRPr lang="en-US" sz="1600" dirty="0"/>
+            </a:p>
+          </p:txBody>
+        </p:sp>
+        <p:sp>
+          <p:nvSpPr>
+            <p:cNvPr id="76" name="Rounded Rectangle 75"/>
+            <p:cNvSpPr/>
+            <p:nvPr/>
+          </p:nvSpPr>
+          <p:spPr>
+            <a:xfrm>
+              <a:off x="6144195" y="1449420"/>
+              <a:ext cx="1210627" cy="210392"/>
+            </a:xfrm>
+            <a:prstGeom prst="roundRect">
+              <a:avLst/>
+            </a:prstGeom>
+          </p:spPr>
+          <p:style>
+            <a:lnRef idx="0">
+              <a:schemeClr val="dk1"/>
+            </a:lnRef>
+            <a:fillRef idx="3">
+              <a:schemeClr val="dk1"/>
+            </a:fillRef>
+            <a:effectRef idx="3">
+              <a:schemeClr val="dk1"/>
+            </a:effectRef>
+            <a:fontRef idx="minor">
+              <a:schemeClr val="lt1"/>
+            </a:fontRef>
+          </p:style>
+          <p:txBody>
+            <a:bodyPr rtlCol="0" anchor="ctr"/>
+            <a:lstStyle/>
+            <a:p>
+              <a:pPr algn="ctr"/>
+              <a:r>
+                <a:rPr lang="en-US" sz="1200" dirty="0" smtClean="0"/>
+                <a:t>x86</a:t>
+              </a:r>
+              <a:endParaRPr lang="en-US" sz="1200" dirty="0"/>
+            </a:p>
+          </p:txBody>
+        </p:sp>
+        <p:cxnSp>
+          <p:nvCxnSpPr>
+            <p:cNvPr id="77" name="Straight Arrow Connector 76"/>
+            <p:cNvCxnSpPr>
+              <a:stCxn id="36" idx="3"/>
+              <a:endCxn id="75" idx="1"/>
+            </p:cNvCxnSpPr>
+            <p:nvPr/>
+          </p:nvCxnSpPr>
+          <p:spPr>
+            <a:xfrm>
+              <a:off x="5267993" y="1368011"/>
+              <a:ext cx="482823" cy="553"/>
+            </a:xfrm>
+            <a:prstGeom prst="straightConnector1">
+              <a:avLst/>
+            </a:prstGeom>
+            <a:ln w="57150">
+              <a:tailEnd type="triangle"/>
+            </a:ln>
+          </p:spPr>
+          <p:style>
+            <a:lnRef idx="3">
+              <a:schemeClr val="accent5"/>
+            </a:lnRef>
+            <a:fillRef idx="0">
+              <a:schemeClr val="accent5"/>
+            </a:fillRef>
+            <a:effectRef idx="2">
+              <a:schemeClr val="accent5"/>
+            </a:effectRef>
+            <a:fontRef idx="minor">
+              <a:schemeClr val="tx1"/>
+            </a:fontRef>
+          </p:style>
+        </p:cxnSp>
+        <p:sp>
+          <p:nvSpPr>
+            <p:cNvPr id="32" name="Rounded Rectangle 31"/>
+            <p:cNvSpPr/>
+            <p:nvPr/>
+          </p:nvSpPr>
+          <p:spPr>
+            <a:xfrm>
+              <a:off x="927622" y="1082634"/>
+              <a:ext cx="1848693" cy="574734"/>
+            </a:xfrm>
+            <a:prstGeom prst="roundRect">
+              <a:avLst/>
+            </a:prstGeom>
+          </p:spPr>
+          <p:style>
+            <a:lnRef idx="0">
+              <a:schemeClr val="accent2"/>
+            </a:lnRef>
+            <a:fillRef idx="3">
+              <a:schemeClr val="accent2"/>
+            </a:fillRef>
+            <a:effectRef idx="3">
+              <a:schemeClr val="accent2"/>
+            </a:effectRef>
+            <a:fontRef idx="minor">
+              <a:schemeClr val="lt1"/>
+            </a:fontRef>
+          </p:style>
+          <p:txBody>
+            <a:bodyPr rtlCol="0" anchor="t"/>
+            <a:lstStyle/>
+            <a:p>
+              <a:pPr algn="ctr"/>
+              <a:r>
+                <a:rPr lang="en-US" sz="1600" dirty="0" err="1"/>
+                <a:t>glibc</a:t>
+              </a:r>
+              <a:r>
+                <a:rPr lang="en-US" sz="1600" dirty="0"/>
+                <a:t> or </a:t>
+              </a:r>
+              <a:r>
+                <a:rPr lang="en-US" sz="1600" dirty="0" err="1"/>
+                <a:t>uClibc</a:t>
+              </a:r>
+              <a:endParaRPr lang="en-US" sz="1600" dirty="0"/>
+            </a:p>
+          </p:txBody>
+        </p:sp>
+        <p:sp>
+          <p:nvSpPr>
+            <p:cNvPr id="33" name="Rounded Rectangle 32"/>
+            <p:cNvSpPr/>
+            <p:nvPr/>
+          </p:nvSpPr>
+          <p:spPr>
+            <a:xfrm>
+              <a:off x="1277433" y="1443554"/>
+              <a:ext cx="1149070" cy="210392"/>
+            </a:xfrm>
+            <a:prstGeom prst="roundRect">
+              <a:avLst/>
+            </a:prstGeom>
+          </p:spPr>
+          <p:style>
+            <a:lnRef idx="0">
+              <a:schemeClr val="dk1"/>
+            </a:lnRef>
+            <a:fillRef idx="3">
+              <a:schemeClr val="dk1"/>
+            </a:fillRef>
+            <a:effectRef idx="3">
+              <a:schemeClr val="dk1"/>
+            </a:effectRef>
+            <a:fontRef idx="minor">
+              <a:schemeClr val="lt1"/>
+            </a:fontRef>
+          </p:style>
+          <p:txBody>
+            <a:bodyPr rtlCol="0" anchor="ctr"/>
+            <a:lstStyle/>
+            <a:p>
+              <a:pPr algn="ctr"/>
+              <a:r>
+                <a:rPr lang="en-US" sz="1200" dirty="0" smtClean="0"/>
+                <a:t>ARM</a:t>
+              </a:r>
+              <a:endParaRPr lang="en-US" sz="1200" dirty="0"/>
+            </a:p>
+          </p:txBody>
+        </p:sp>
+        <p:cxnSp>
+          <p:nvCxnSpPr>
+            <p:cNvPr id="34" name="Straight Arrow Connector 33"/>
+            <p:cNvCxnSpPr>
+              <a:stCxn id="32" idx="3"/>
+              <a:endCxn id="36" idx="1"/>
+            </p:cNvCxnSpPr>
+            <p:nvPr/>
+          </p:nvCxnSpPr>
+          <p:spPr>
+            <a:xfrm flipV="1">
+              <a:off x="2776315" y="1368011"/>
+              <a:ext cx="494293" cy="1990"/>
+            </a:xfrm>
+            <a:prstGeom prst="straightConnector1">
+              <a:avLst/>
+            </a:prstGeom>
+            <a:ln w="57150">
+              <a:tailEnd type="triangle"/>
+            </a:ln>
+          </p:spPr>
+          <p:style>
+            <a:lnRef idx="3">
+              <a:schemeClr val="accent2"/>
+            </a:lnRef>
+            <a:fillRef idx="0">
+              <a:schemeClr val="accent2"/>
+            </a:fillRef>
+            <a:effectRef idx="2">
+              <a:schemeClr val="accent2"/>
+            </a:effectRef>
+            <a:fontRef idx="minor">
+              <a:schemeClr val="tx1"/>
+            </a:fontRef>
+          </p:style>
+        </p:cxnSp>
+        <p:sp>
+          <p:nvSpPr>
+            <p:cNvPr id="36" name="Rounded Rectangle 35"/>
+            <p:cNvSpPr/>
+            <p:nvPr/>
+          </p:nvSpPr>
+          <p:spPr>
+            <a:xfrm>
+              <a:off x="3270608" y="956018"/>
+              <a:ext cx="1997385" cy="823986"/>
+            </a:xfrm>
+            <a:prstGeom prst="roundRect">
+              <a:avLst/>
+            </a:prstGeom>
+          </p:spPr>
+          <p:style>
+            <a:lnRef idx="0">
+              <a:schemeClr val="accent6"/>
+            </a:lnRef>
+            <a:fillRef idx="3">
+              <a:schemeClr val="accent6"/>
+            </a:fillRef>
+            <a:effectRef idx="3">
+              <a:schemeClr val="accent6"/>
+            </a:effectRef>
+            <a:fontRef idx="minor">
+              <a:schemeClr val="lt1"/>
+            </a:fontRef>
+          </p:style>
+          <p:txBody>
+            <a:bodyPr rtlCol="0" anchor="t"/>
+            <a:lstStyle/>
+            <a:p>
+              <a:pPr algn="ctr"/>
+              <a:r>
+                <a:rPr lang="en-US" sz="1600" dirty="0" smtClean="0"/>
+                <a:t>Compiler, assembler and linker</a:t>
+              </a:r>
+              <a:endParaRPr lang="en-US" sz="1600" dirty="0"/>
+            </a:p>
+          </p:txBody>
+        </p:sp>
+        <p:sp>
+          <p:nvSpPr>
+            <p:cNvPr id="37" name="Rounded Rectangle 36"/>
+            <p:cNvSpPr/>
+            <p:nvPr/>
+          </p:nvSpPr>
+          <p:spPr>
+            <a:xfrm>
+              <a:off x="3663986" y="1566189"/>
+              <a:ext cx="1210627" cy="210392"/>
+            </a:xfrm>
+            <a:prstGeom prst="roundRect">
+              <a:avLst/>
+            </a:prstGeom>
+          </p:spPr>
+          <p:style>
+            <a:lnRef idx="0">
+              <a:schemeClr val="dk1"/>
+            </a:lnRef>
+            <a:fillRef idx="3">
+              <a:schemeClr val="dk1"/>
+            </a:fillRef>
+            <a:effectRef idx="3">
+              <a:schemeClr val="dk1"/>
+            </a:effectRef>
+            <a:fontRef idx="minor">
+              <a:schemeClr val="lt1"/>
+            </a:fontRef>
+          </p:style>
+          <p:txBody>
+            <a:bodyPr rtlCol="0" anchor="ctr"/>
+            <a:lstStyle/>
+            <a:p>
+              <a:pPr algn="ctr"/>
+              <a:r>
+                <a:rPr lang="en-US" sz="1200" dirty="0" smtClean="0"/>
+                <a:t>x86</a:t>
+              </a:r>
+              <a:endParaRPr lang="en-US" sz="1200" dirty="0"/>
+            </a:p>
+          </p:txBody>
+        </p:sp>
+        <p:sp>
+          <p:nvSpPr>
+            <p:cNvPr id="35" name="TextBox 34"/>
+            <p:cNvSpPr txBox="1"/>
+            <p:nvPr/>
+          </p:nvSpPr>
+          <p:spPr>
+            <a:xfrm>
+              <a:off x="1555252" y="316401"/>
+              <a:ext cx="593432" cy="461665"/>
+            </a:xfrm>
+            <a:prstGeom prst="rect">
+              <a:avLst/>
+            </a:prstGeom>
+            <a:noFill/>
+          </p:spPr>
+          <p:txBody>
+            <a:bodyPr wrap="none" rtlCol="0">
+              <a:spAutoFit/>
+            </a:bodyPr>
+            <a:lstStyle/>
+            <a:p>
+              <a:r>
+                <a:rPr lang="en-US" sz="2400" dirty="0" smtClean="0">
+                  <a:solidFill>
+                    <a:srgbClr val="FF0000"/>
+                  </a:solidFill>
+                </a:rPr>
+                <a:t>❹</a:t>
+              </a:r>
+              <a:endParaRPr lang="en-US" sz="2400" dirty="0">
+                <a:solidFill>
+                  <a:srgbClr val="FF0000"/>
+                </a:solidFill>
+              </a:endParaRPr>
+            </a:p>
+          </p:txBody>
+        </p:sp>
+      </p:grpSp>
+      <p:grpSp>
+        <p:nvGrpSpPr>
+          <p:cNvPr id="4" name="Group 3"/>
+          <p:cNvGrpSpPr/>
+          <p:nvPr/>
+        </p:nvGrpSpPr>
+        <p:grpSpPr>
+          <a:xfrm>
+            <a:off x="918765" y="4322821"/>
+            <a:ext cx="6820579" cy="1548359"/>
+            <a:chOff x="918765" y="4322821"/>
+            <a:chExt cx="6820579" cy="1548359"/>
+          </a:xfrm>
+        </p:grpSpPr>
+        <p:sp>
+          <p:nvSpPr>
+            <p:cNvPr id="61" name="Rounded Rectangle 60"/>
+            <p:cNvSpPr/>
+            <p:nvPr/>
+          </p:nvSpPr>
+          <p:spPr>
+            <a:xfrm>
+              <a:off x="3241859" y="4322821"/>
+              <a:ext cx="2060099" cy="315589"/>
+            </a:xfrm>
+            <a:prstGeom prst="roundRect">
+              <a:avLst/>
+            </a:prstGeom>
+          </p:spPr>
+          <p:style>
+            <a:lnRef idx="0">
+              <a:schemeClr val="accent3"/>
+            </a:lnRef>
+            <a:fillRef idx="3">
+              <a:schemeClr val="accent3"/>
+            </a:fillRef>
+            <a:effectRef idx="3">
+              <a:schemeClr val="accent3"/>
+            </a:effectRef>
+            <a:fontRef idx="minor">
+              <a:schemeClr val="lt1"/>
+            </a:fontRef>
+          </p:style>
+          <p:txBody>
+            <a:bodyPr rtlCol="0" anchor="ctr"/>
+            <a:lstStyle/>
+            <a:p>
+              <a:pPr algn="ctr"/>
+              <a:r>
+                <a:rPr lang="en-US" sz="1600" dirty="0" smtClean="0"/>
+                <a:t>Application source</a:t>
+              </a:r>
+              <a:endParaRPr lang="en-US" sz="1600" dirty="0"/>
+            </a:p>
+          </p:txBody>
+        </p:sp>
+        <p:cxnSp>
+          <p:nvCxnSpPr>
+            <p:cNvPr id="62" name="Straight Arrow Connector 61"/>
+            <p:cNvCxnSpPr>
+              <a:stCxn id="61" idx="2"/>
+              <a:endCxn id="70" idx="0"/>
+            </p:cNvCxnSpPr>
+            <p:nvPr/>
+          </p:nvCxnSpPr>
+          <p:spPr>
+            <a:xfrm flipH="1">
+              <a:off x="4260444" y="4638410"/>
+              <a:ext cx="11465" cy="408784"/>
+            </a:xfrm>
+            <a:prstGeom prst="straightConnector1">
+              <a:avLst/>
+            </a:prstGeom>
+            <a:ln w="57150">
+              <a:tailEnd type="triangle"/>
+            </a:ln>
+          </p:spPr>
+          <p:style>
+            <a:lnRef idx="3">
+              <a:schemeClr val="accent3"/>
+            </a:lnRef>
+            <a:fillRef idx="0">
+              <a:schemeClr val="accent3"/>
+            </a:fillRef>
+            <a:effectRef idx="2">
+              <a:schemeClr val="accent3"/>
+            </a:effectRef>
+            <a:fontRef idx="minor">
+              <a:schemeClr val="tx1"/>
+            </a:fontRef>
+          </p:style>
+        </p:cxnSp>
+        <p:sp>
+          <p:nvSpPr>
+            <p:cNvPr id="64" name="Rounded Rectangle 63"/>
+            <p:cNvSpPr/>
+            <p:nvPr/>
+          </p:nvSpPr>
+          <p:spPr>
+            <a:xfrm>
+              <a:off x="5741959" y="5173810"/>
+              <a:ext cx="1997385" cy="571859"/>
+            </a:xfrm>
+            <a:prstGeom prst="roundRect">
+              <a:avLst/>
+            </a:prstGeom>
+          </p:spPr>
+          <p:style>
+            <a:lnRef idx="0">
+              <a:schemeClr val="accent2"/>
+            </a:lnRef>
+            <a:fillRef idx="3">
+              <a:schemeClr val="accent2"/>
+            </a:fillRef>
+            <a:effectRef idx="3">
+              <a:schemeClr val="accent2"/>
+            </a:effectRef>
+            <a:fontRef idx="minor">
+              <a:schemeClr val="lt1"/>
+            </a:fontRef>
+          </p:style>
+          <p:txBody>
+            <a:bodyPr rtlCol="0" anchor="t"/>
+            <a:lstStyle/>
+            <a:p>
+              <a:pPr algn="ctr"/>
+              <a:r>
+                <a:rPr lang="en-US" sz="1600" dirty="0" smtClean="0"/>
+                <a:t>Application</a:t>
+              </a:r>
+              <a:endParaRPr lang="en-US" sz="1600" dirty="0"/>
+            </a:p>
+          </p:txBody>
+        </p:sp>
+        <p:sp>
+          <p:nvSpPr>
+            <p:cNvPr id="65" name="Rounded Rectangle 64"/>
+            <p:cNvSpPr/>
+            <p:nvPr/>
+          </p:nvSpPr>
+          <p:spPr>
+            <a:xfrm>
+              <a:off x="6135338" y="5540596"/>
+              <a:ext cx="1210627" cy="210392"/>
+            </a:xfrm>
+            <a:prstGeom prst="roundRect">
+              <a:avLst/>
+            </a:prstGeom>
+          </p:spPr>
+          <p:style>
+            <a:lnRef idx="0">
+              <a:schemeClr val="dk1"/>
+            </a:lnRef>
+            <a:fillRef idx="3">
+              <a:schemeClr val="dk1"/>
+            </a:fillRef>
+            <a:effectRef idx="3">
+              <a:schemeClr val="dk1"/>
+            </a:effectRef>
+            <a:fontRef idx="minor">
+              <a:schemeClr val="lt1"/>
+            </a:fontRef>
+          </p:style>
+          <p:txBody>
+            <a:bodyPr rtlCol="0" anchor="ctr"/>
+            <a:lstStyle/>
+            <a:p>
+              <a:pPr algn="ctr"/>
+              <a:r>
+                <a:rPr lang="en-US" sz="1200" dirty="0" smtClean="0"/>
+                <a:t>ARM</a:t>
+              </a:r>
+              <a:endParaRPr lang="en-US" sz="1200" dirty="0"/>
+            </a:p>
+          </p:txBody>
+        </p:sp>
+        <p:cxnSp>
+          <p:nvCxnSpPr>
+            <p:cNvPr id="66" name="Straight Arrow Connector 65"/>
+            <p:cNvCxnSpPr>
+              <a:stCxn id="70" idx="3"/>
+              <a:endCxn id="64" idx="1"/>
+            </p:cNvCxnSpPr>
+            <p:nvPr/>
+          </p:nvCxnSpPr>
+          <p:spPr>
+            <a:xfrm>
+              <a:off x="5259136" y="5459187"/>
+              <a:ext cx="482823" cy="553"/>
+            </a:xfrm>
+            <a:prstGeom prst="straightConnector1">
+              <a:avLst/>
+            </a:prstGeom>
+            <a:ln w="57150">
+              <a:tailEnd type="triangle"/>
+            </a:ln>
+          </p:spPr>
+          <p:style>
+            <a:lnRef idx="3">
+              <a:schemeClr val="accent5"/>
+            </a:lnRef>
+            <a:fillRef idx="0">
+              <a:schemeClr val="accent5"/>
+            </a:fillRef>
+            <a:effectRef idx="2">
+              <a:schemeClr val="accent5"/>
+            </a:effectRef>
+            <a:fontRef idx="minor">
+              <a:schemeClr val="tx1"/>
+            </a:fontRef>
+          </p:style>
+        </p:cxnSp>
+        <p:sp>
+          <p:nvSpPr>
+            <p:cNvPr id="67" name="Rounded Rectangle 66"/>
+            <p:cNvSpPr/>
+            <p:nvPr/>
+          </p:nvSpPr>
+          <p:spPr>
+            <a:xfrm>
+              <a:off x="918765" y="5173810"/>
+              <a:ext cx="1848693" cy="574734"/>
+            </a:xfrm>
+            <a:prstGeom prst="roundRect">
+              <a:avLst/>
+            </a:prstGeom>
+          </p:spPr>
+          <p:style>
+            <a:lnRef idx="0">
+              <a:schemeClr val="accent2"/>
+            </a:lnRef>
+            <a:fillRef idx="3">
+              <a:schemeClr val="accent2"/>
+            </a:fillRef>
+            <a:effectRef idx="3">
+              <a:schemeClr val="accent2"/>
+            </a:effectRef>
+            <a:fontRef idx="minor">
+              <a:schemeClr val="lt1"/>
+            </a:fontRef>
+          </p:style>
+          <p:txBody>
+            <a:bodyPr rtlCol="0" anchor="t"/>
+            <a:lstStyle/>
+            <a:p>
+              <a:pPr algn="ctr"/>
+              <a:r>
+                <a:rPr lang="en-US" sz="1600" dirty="0" err="1"/>
+                <a:t>glibc</a:t>
+              </a:r>
+              <a:r>
+                <a:rPr lang="en-US" sz="1600" dirty="0"/>
+                <a:t> or </a:t>
+              </a:r>
+              <a:r>
+                <a:rPr lang="en-US" sz="1600" dirty="0" err="1"/>
+                <a:t>uClibc</a:t>
+              </a:r>
+              <a:endParaRPr lang="en-US" sz="1600" dirty="0"/>
+            </a:p>
+          </p:txBody>
+        </p:sp>
+        <p:sp>
+          <p:nvSpPr>
+            <p:cNvPr id="68" name="Rounded Rectangle 67"/>
+            <p:cNvSpPr/>
+            <p:nvPr/>
+          </p:nvSpPr>
+          <p:spPr>
+            <a:xfrm>
+              <a:off x="1268576" y="5534730"/>
+              <a:ext cx="1149070" cy="210392"/>
+            </a:xfrm>
+            <a:prstGeom prst="roundRect">
+              <a:avLst/>
+            </a:prstGeom>
+          </p:spPr>
+          <p:style>
+            <a:lnRef idx="0">
+              <a:schemeClr val="dk1"/>
+            </a:lnRef>
+            <a:fillRef idx="3">
+              <a:schemeClr val="dk1"/>
+            </a:fillRef>
+            <a:effectRef idx="3">
+              <a:schemeClr val="dk1"/>
+            </a:effectRef>
+            <a:fontRef idx="minor">
+              <a:schemeClr val="lt1"/>
+            </a:fontRef>
+          </p:style>
+          <p:txBody>
+            <a:bodyPr rtlCol="0" anchor="ctr"/>
+            <a:lstStyle/>
+            <a:p>
+              <a:pPr algn="ctr"/>
+              <a:r>
+                <a:rPr lang="en-US" sz="1200" dirty="0" smtClean="0"/>
+                <a:t>ARM</a:t>
+              </a:r>
+              <a:endParaRPr lang="en-US" sz="1200" dirty="0"/>
+            </a:p>
+          </p:txBody>
+        </p:sp>
+        <p:cxnSp>
+          <p:nvCxnSpPr>
+            <p:cNvPr id="69" name="Straight Arrow Connector 68"/>
+            <p:cNvCxnSpPr>
+              <a:stCxn id="67" idx="3"/>
+              <a:endCxn id="70" idx="1"/>
+            </p:cNvCxnSpPr>
+            <p:nvPr/>
+          </p:nvCxnSpPr>
+          <p:spPr>
+            <a:xfrm flipV="1">
+              <a:off x="2767458" y="5459187"/>
+              <a:ext cx="494293" cy="1990"/>
+            </a:xfrm>
+            <a:prstGeom prst="straightConnector1">
+              <a:avLst/>
+            </a:prstGeom>
+            <a:ln w="57150">
+              <a:tailEnd type="triangle"/>
+            </a:ln>
+          </p:spPr>
+          <p:style>
+            <a:lnRef idx="3">
+              <a:schemeClr val="accent2"/>
+            </a:lnRef>
+            <a:fillRef idx="0">
+              <a:schemeClr val="accent2"/>
+            </a:fillRef>
+            <a:effectRef idx="2">
+              <a:schemeClr val="accent2"/>
+            </a:effectRef>
+            <a:fontRef idx="minor">
+              <a:schemeClr val="tx1"/>
+            </a:fontRef>
+          </p:style>
+        </p:cxnSp>
+        <p:sp>
+          <p:nvSpPr>
+            <p:cNvPr id="70" name="Rounded Rectangle 69"/>
+            <p:cNvSpPr/>
+            <p:nvPr/>
+          </p:nvSpPr>
+          <p:spPr>
+            <a:xfrm>
+              <a:off x="3261751" y="5047194"/>
+              <a:ext cx="1997385" cy="823986"/>
+            </a:xfrm>
+            <a:prstGeom prst="roundRect">
+              <a:avLst/>
+            </a:prstGeom>
+          </p:spPr>
+          <p:style>
+            <a:lnRef idx="0">
+              <a:schemeClr val="accent6"/>
+            </a:lnRef>
+            <a:fillRef idx="3">
+              <a:schemeClr val="accent6"/>
+            </a:fillRef>
+            <a:effectRef idx="3">
+              <a:schemeClr val="accent6"/>
+            </a:effectRef>
+            <a:fontRef idx="minor">
+              <a:schemeClr val="lt1"/>
+            </a:fontRef>
+          </p:style>
+          <p:txBody>
+            <a:bodyPr rtlCol="0" anchor="t"/>
+            <a:lstStyle/>
+            <a:p>
+              <a:pPr algn="ctr"/>
+              <a:r>
+                <a:rPr lang="en-US" sz="1600" dirty="0" smtClean="0"/>
+                <a:t>Cross-compiler and </a:t>
+              </a:r>
+              <a:r>
+                <a:rPr lang="en-US" sz="1600" dirty="0" err="1" smtClean="0"/>
+                <a:t>binutils</a:t>
+              </a:r>
+              <a:endParaRPr lang="en-US" sz="1600" dirty="0"/>
+            </a:p>
+          </p:txBody>
+        </p:sp>
+        <p:sp>
+          <p:nvSpPr>
+            <p:cNvPr id="71" name="Rounded Rectangle 70"/>
+            <p:cNvSpPr/>
+            <p:nvPr/>
+          </p:nvSpPr>
+          <p:spPr>
+            <a:xfrm>
+              <a:off x="3655129" y="5657365"/>
+              <a:ext cx="1210627" cy="210392"/>
+            </a:xfrm>
+            <a:prstGeom prst="roundRect">
+              <a:avLst/>
+            </a:prstGeom>
+          </p:spPr>
+          <p:style>
+            <a:lnRef idx="0">
+              <a:schemeClr val="dk1"/>
+            </a:lnRef>
+            <a:fillRef idx="3">
+              <a:schemeClr val="dk1"/>
+            </a:fillRef>
+            <a:effectRef idx="3">
+              <a:schemeClr val="dk1"/>
+            </a:effectRef>
+            <a:fontRef idx="minor">
+              <a:schemeClr val="lt1"/>
+            </a:fontRef>
+          </p:style>
+          <p:txBody>
+            <a:bodyPr rtlCol="0" anchor="ctr"/>
+            <a:lstStyle/>
+            <a:p>
+              <a:pPr algn="ctr"/>
+              <a:r>
+                <a:rPr lang="en-US" sz="1200" dirty="0" smtClean="0"/>
+                <a:t>x86</a:t>
+              </a:r>
+              <a:endParaRPr lang="en-US" sz="1200" dirty="0"/>
+            </a:p>
+          </p:txBody>
+        </p:sp>
+        <p:sp>
+          <p:nvSpPr>
+            <p:cNvPr id="38" name="TextBox 37"/>
+            <p:cNvSpPr txBox="1"/>
+            <p:nvPr/>
+          </p:nvSpPr>
+          <p:spPr>
+            <a:xfrm>
+              <a:off x="1555252" y="4407577"/>
+              <a:ext cx="593432" cy="461665"/>
+            </a:xfrm>
+            <a:prstGeom prst="rect">
+              <a:avLst/>
+            </a:prstGeom>
+            <a:noFill/>
+          </p:spPr>
+          <p:txBody>
+            <a:bodyPr wrap="none" rtlCol="0">
+              <a:spAutoFit/>
+            </a:bodyPr>
+            <a:lstStyle/>
+            <a:p>
+              <a:r>
+                <a:rPr lang="en-US" sz="2400" dirty="0" smtClean="0">
+                  <a:solidFill>
+                    <a:srgbClr val="FF0000"/>
+                  </a:solidFill>
+                </a:rPr>
+                <a:t>❻</a:t>
+              </a:r>
+              <a:endParaRPr lang="en-US" sz="2400" dirty="0">
+                <a:solidFill>
+                  <a:srgbClr val="FF0000"/>
+                </a:solidFill>
+              </a:endParaRPr>
+            </a:p>
+          </p:txBody>
+        </p:sp>
+      </p:grpSp>
+      <p:grpSp>
+        <p:nvGrpSpPr>
+          <p:cNvPr id="3" name="Group 2"/>
+          <p:cNvGrpSpPr/>
+          <p:nvPr/>
+        </p:nvGrpSpPr>
+        <p:grpSpPr>
+          <a:xfrm>
+            <a:off x="927622" y="2264117"/>
+            <a:ext cx="6820579" cy="1548359"/>
+            <a:chOff x="927622" y="2264117"/>
+            <a:chExt cx="6820579" cy="1548359"/>
+          </a:xfrm>
+        </p:grpSpPr>
+        <p:sp>
+          <p:nvSpPr>
+            <p:cNvPr id="48" name="Rounded Rectangle 47"/>
+            <p:cNvSpPr/>
+            <p:nvPr/>
+          </p:nvSpPr>
+          <p:spPr>
+            <a:xfrm>
+              <a:off x="3250716" y="2264117"/>
+              <a:ext cx="2060099" cy="315589"/>
+            </a:xfrm>
+            <a:prstGeom prst="roundRect">
+              <a:avLst/>
+            </a:prstGeom>
+          </p:spPr>
+          <p:style>
+            <a:lnRef idx="0">
+              <a:schemeClr val="accent3"/>
+            </a:lnRef>
+            <a:fillRef idx="3">
+              <a:schemeClr val="accent3"/>
+            </a:fillRef>
+            <a:effectRef idx="3">
+              <a:schemeClr val="accent3"/>
+            </a:effectRef>
+            <a:fontRef idx="minor">
+              <a:schemeClr val="lt1"/>
+            </a:fontRef>
+          </p:style>
+          <p:txBody>
+            <a:bodyPr rtlCol="0" anchor="ctr"/>
+            <a:lstStyle/>
+            <a:p>
+              <a:pPr algn="ctr"/>
+              <a:r>
+                <a:rPr lang="en-US" sz="1600" dirty="0" smtClean="0"/>
+                <a:t>Linux kernel source</a:t>
+              </a:r>
+              <a:endParaRPr lang="en-US" sz="1600" dirty="0"/>
+            </a:p>
+          </p:txBody>
+        </p:sp>
+        <p:cxnSp>
+          <p:nvCxnSpPr>
+            <p:cNvPr id="49" name="Straight Arrow Connector 48"/>
+            <p:cNvCxnSpPr>
+              <a:stCxn id="48" idx="2"/>
+              <a:endCxn id="56" idx="0"/>
+            </p:cNvCxnSpPr>
+            <p:nvPr/>
+          </p:nvCxnSpPr>
+          <p:spPr>
+            <a:xfrm flipH="1">
+              <a:off x="4269301" y="2579706"/>
+              <a:ext cx="11465" cy="408784"/>
+            </a:xfrm>
+            <a:prstGeom prst="straightConnector1">
+              <a:avLst/>
+            </a:prstGeom>
+            <a:ln w="57150">
+              <a:tailEnd type="triangle"/>
+            </a:ln>
+          </p:spPr>
+          <p:style>
+            <a:lnRef idx="3">
+              <a:schemeClr val="accent3"/>
+            </a:lnRef>
+            <a:fillRef idx="0">
+              <a:schemeClr val="accent3"/>
+            </a:fillRef>
+            <a:effectRef idx="2">
+              <a:schemeClr val="accent3"/>
+            </a:effectRef>
+            <a:fontRef idx="minor">
+              <a:schemeClr val="tx1"/>
+            </a:fontRef>
+          </p:style>
+        </p:cxnSp>
+        <p:sp>
+          <p:nvSpPr>
+            <p:cNvPr id="50" name="Rounded Rectangle 49"/>
+            <p:cNvSpPr/>
+            <p:nvPr/>
+          </p:nvSpPr>
+          <p:spPr>
+            <a:xfrm>
+              <a:off x="5750816" y="3115106"/>
+              <a:ext cx="1997385" cy="571859"/>
+            </a:xfrm>
+            <a:prstGeom prst="roundRect">
+              <a:avLst/>
+            </a:prstGeom>
+          </p:spPr>
+          <p:style>
+            <a:lnRef idx="0">
+              <a:schemeClr val="accent2"/>
+            </a:lnRef>
+            <a:fillRef idx="3">
+              <a:schemeClr val="accent2"/>
+            </a:fillRef>
+            <a:effectRef idx="3">
+              <a:schemeClr val="accent2"/>
+            </a:effectRef>
+            <a:fontRef idx="minor">
+              <a:schemeClr val="lt1"/>
+            </a:fontRef>
+          </p:style>
+          <p:txBody>
+            <a:bodyPr rtlCol="0" anchor="t"/>
+            <a:lstStyle/>
+            <a:p>
+              <a:pPr algn="ctr"/>
+              <a:r>
+                <a:rPr lang="en-US" sz="1600" dirty="0"/>
+                <a:t>Linux kernel</a:t>
+              </a:r>
+            </a:p>
+          </p:txBody>
+        </p:sp>
+        <p:sp>
+          <p:nvSpPr>
+            <p:cNvPr id="51" name="Rounded Rectangle 50"/>
+            <p:cNvSpPr/>
+            <p:nvPr/>
+          </p:nvSpPr>
+          <p:spPr>
+            <a:xfrm>
+              <a:off x="6144195" y="3481892"/>
+              <a:ext cx="1210627" cy="210392"/>
+            </a:xfrm>
+            <a:prstGeom prst="roundRect">
+              <a:avLst/>
+            </a:prstGeom>
+          </p:spPr>
+          <p:style>
+            <a:lnRef idx="0">
+              <a:schemeClr val="dk1"/>
+            </a:lnRef>
+            <a:fillRef idx="3">
+              <a:schemeClr val="dk1"/>
+            </a:fillRef>
+            <a:effectRef idx="3">
+              <a:schemeClr val="dk1"/>
+            </a:effectRef>
+            <a:fontRef idx="minor">
+              <a:schemeClr val="lt1"/>
+            </a:fontRef>
+          </p:style>
+          <p:txBody>
+            <a:bodyPr rtlCol="0" anchor="ctr"/>
+            <a:lstStyle/>
+            <a:p>
+              <a:pPr algn="ctr"/>
+              <a:r>
+                <a:rPr lang="en-US" sz="1200" dirty="0" smtClean="0"/>
+                <a:t>ARM</a:t>
+              </a:r>
+              <a:endParaRPr lang="en-US" sz="1200" dirty="0"/>
+            </a:p>
+          </p:txBody>
+        </p:sp>
+        <p:cxnSp>
+          <p:nvCxnSpPr>
+            <p:cNvPr id="52" name="Straight Arrow Connector 51"/>
+            <p:cNvCxnSpPr>
+              <a:stCxn id="56" idx="3"/>
+              <a:endCxn id="50" idx="1"/>
+            </p:cNvCxnSpPr>
+            <p:nvPr/>
+          </p:nvCxnSpPr>
+          <p:spPr>
+            <a:xfrm>
+              <a:off x="5267993" y="3400483"/>
+              <a:ext cx="482823" cy="553"/>
+            </a:xfrm>
+            <a:prstGeom prst="straightConnector1">
+              <a:avLst/>
+            </a:prstGeom>
+            <a:ln w="57150">
+              <a:tailEnd type="triangle"/>
+            </a:ln>
+          </p:spPr>
+          <p:style>
+            <a:lnRef idx="3">
+              <a:schemeClr val="accent5"/>
+            </a:lnRef>
+            <a:fillRef idx="0">
+              <a:schemeClr val="accent5"/>
+            </a:fillRef>
+            <a:effectRef idx="2">
+              <a:schemeClr val="accent5"/>
+            </a:effectRef>
+            <a:fontRef idx="minor">
+              <a:schemeClr val="tx1"/>
+            </a:fontRef>
+          </p:style>
+        </p:cxnSp>
+        <p:sp>
+          <p:nvSpPr>
+            <p:cNvPr id="53" name="Rounded Rectangle 52"/>
+            <p:cNvSpPr/>
+            <p:nvPr/>
+          </p:nvSpPr>
+          <p:spPr>
+            <a:xfrm>
+              <a:off x="927622" y="3115106"/>
+              <a:ext cx="1848693" cy="574734"/>
+            </a:xfrm>
+            <a:prstGeom prst="roundRect">
+              <a:avLst/>
+            </a:prstGeom>
+          </p:spPr>
+          <p:style>
+            <a:lnRef idx="0">
+              <a:schemeClr val="accent2"/>
+            </a:lnRef>
+            <a:fillRef idx="3">
+              <a:schemeClr val="accent2"/>
+            </a:fillRef>
+            <a:effectRef idx="3">
+              <a:schemeClr val="accent2"/>
+            </a:effectRef>
+            <a:fontRef idx="minor">
+              <a:schemeClr val="lt1"/>
+            </a:fontRef>
+          </p:style>
+          <p:txBody>
+            <a:bodyPr rtlCol="0" anchor="t"/>
+            <a:lstStyle/>
+            <a:p>
+              <a:pPr algn="ctr"/>
+              <a:r>
+                <a:rPr lang="en-US" sz="1600" dirty="0" err="1"/>
+                <a:t>glibc</a:t>
+              </a:r>
+              <a:r>
+                <a:rPr lang="en-US" sz="1600" dirty="0"/>
+                <a:t> or </a:t>
+              </a:r>
+              <a:r>
+                <a:rPr lang="en-US" sz="1600" dirty="0" err="1"/>
+                <a:t>uClibc</a:t>
+              </a:r>
+              <a:endParaRPr lang="en-US" sz="1600" dirty="0"/>
+            </a:p>
+          </p:txBody>
+        </p:sp>
+        <p:sp>
+          <p:nvSpPr>
+            <p:cNvPr id="54" name="Rounded Rectangle 53"/>
+            <p:cNvSpPr/>
+            <p:nvPr/>
+          </p:nvSpPr>
+          <p:spPr>
+            <a:xfrm>
+              <a:off x="1277433" y="3476026"/>
+              <a:ext cx="1149070" cy="210392"/>
+            </a:xfrm>
+            <a:prstGeom prst="roundRect">
+              <a:avLst/>
+            </a:prstGeom>
+          </p:spPr>
+          <p:style>
+            <a:lnRef idx="0">
+              <a:schemeClr val="dk1"/>
+            </a:lnRef>
+            <a:fillRef idx="3">
+              <a:schemeClr val="dk1"/>
+            </a:fillRef>
+            <a:effectRef idx="3">
+              <a:schemeClr val="dk1"/>
+            </a:effectRef>
+            <a:fontRef idx="minor">
+              <a:schemeClr val="lt1"/>
+            </a:fontRef>
+          </p:style>
+          <p:txBody>
+            <a:bodyPr rtlCol="0" anchor="ctr"/>
+            <a:lstStyle/>
+            <a:p>
+              <a:pPr algn="ctr"/>
+              <a:r>
+                <a:rPr lang="en-US" sz="1200" dirty="0" smtClean="0"/>
+                <a:t>ARM</a:t>
+              </a:r>
+              <a:endParaRPr lang="en-US" sz="1200" dirty="0"/>
+            </a:p>
+          </p:txBody>
+        </p:sp>
+        <p:cxnSp>
+          <p:nvCxnSpPr>
+            <p:cNvPr id="55" name="Straight Arrow Connector 54"/>
+            <p:cNvCxnSpPr>
+              <a:stCxn id="53" idx="3"/>
+              <a:endCxn id="56" idx="1"/>
+            </p:cNvCxnSpPr>
+            <p:nvPr/>
+          </p:nvCxnSpPr>
+          <p:spPr>
+            <a:xfrm flipV="1">
+              <a:off x="2776315" y="3400483"/>
+              <a:ext cx="494293" cy="1990"/>
+            </a:xfrm>
+            <a:prstGeom prst="straightConnector1">
+              <a:avLst/>
+            </a:prstGeom>
+            <a:ln w="57150">
+              <a:tailEnd type="triangle"/>
+            </a:ln>
+          </p:spPr>
+          <p:style>
+            <a:lnRef idx="3">
+              <a:schemeClr val="accent2"/>
+            </a:lnRef>
+            <a:fillRef idx="0">
+              <a:schemeClr val="accent2"/>
+            </a:fillRef>
+            <a:effectRef idx="2">
+              <a:schemeClr val="accent2"/>
+            </a:effectRef>
+            <a:fontRef idx="minor">
+              <a:schemeClr val="tx1"/>
+            </a:fontRef>
+          </p:style>
+        </p:cxnSp>
+        <p:sp>
+          <p:nvSpPr>
+            <p:cNvPr id="56" name="Rounded Rectangle 55"/>
+            <p:cNvSpPr/>
+            <p:nvPr/>
+          </p:nvSpPr>
+          <p:spPr>
+            <a:xfrm>
+              <a:off x="3270608" y="2988490"/>
+              <a:ext cx="1997385" cy="823986"/>
+            </a:xfrm>
+            <a:prstGeom prst="roundRect">
+              <a:avLst/>
+            </a:prstGeom>
+          </p:spPr>
+          <p:style>
+            <a:lnRef idx="0">
+              <a:schemeClr val="accent6"/>
+            </a:lnRef>
+            <a:fillRef idx="3">
+              <a:schemeClr val="accent6"/>
+            </a:fillRef>
+            <a:effectRef idx="3">
+              <a:schemeClr val="accent6"/>
+            </a:effectRef>
+            <a:fontRef idx="minor">
+              <a:schemeClr val="lt1"/>
+            </a:fontRef>
+          </p:style>
+          <p:txBody>
+            <a:bodyPr rtlCol="0" anchor="t"/>
+            <a:lstStyle/>
+            <a:p>
+              <a:pPr algn="ctr"/>
+              <a:r>
+                <a:rPr lang="en-US" sz="1600" dirty="0" smtClean="0"/>
+                <a:t>Cross-compiler and </a:t>
+              </a:r>
+              <a:r>
+                <a:rPr lang="en-US" sz="1600" dirty="0" err="1" smtClean="0"/>
+                <a:t>binutils</a:t>
+              </a:r>
+              <a:endParaRPr lang="en-US" sz="1600" dirty="0"/>
+            </a:p>
+          </p:txBody>
+        </p:sp>
+        <p:sp>
+          <p:nvSpPr>
+            <p:cNvPr id="60" name="Rounded Rectangle 59"/>
+            <p:cNvSpPr/>
+            <p:nvPr/>
+          </p:nvSpPr>
+          <p:spPr>
+            <a:xfrm>
+              <a:off x="3663986" y="3598661"/>
+              <a:ext cx="1210627" cy="210392"/>
+            </a:xfrm>
+            <a:prstGeom prst="roundRect">
+              <a:avLst/>
+            </a:prstGeom>
+          </p:spPr>
+          <p:style>
+            <a:lnRef idx="0">
+              <a:schemeClr val="dk1"/>
+            </a:lnRef>
+            <a:fillRef idx="3">
+              <a:schemeClr val="dk1"/>
+            </a:fillRef>
+            <a:effectRef idx="3">
+              <a:schemeClr val="dk1"/>
+            </a:effectRef>
+            <a:fontRef idx="minor">
+              <a:schemeClr val="lt1"/>
+            </a:fontRef>
+          </p:style>
+          <p:txBody>
+            <a:bodyPr rtlCol="0" anchor="ctr"/>
+            <a:lstStyle/>
+            <a:p>
+              <a:pPr algn="ctr"/>
+              <a:r>
+                <a:rPr lang="en-US" sz="1200" dirty="0" smtClean="0"/>
+                <a:t>x86</a:t>
+              </a:r>
+              <a:endParaRPr lang="en-US" sz="1200" dirty="0"/>
+            </a:p>
+          </p:txBody>
+        </p:sp>
+        <p:sp>
+          <p:nvSpPr>
+            <p:cNvPr id="39" name="TextBox 38"/>
+            <p:cNvSpPr txBox="1"/>
+            <p:nvPr/>
+          </p:nvSpPr>
+          <p:spPr>
+            <a:xfrm>
+              <a:off x="1546395" y="2348873"/>
+              <a:ext cx="593432" cy="461665"/>
+            </a:xfrm>
+            <a:prstGeom prst="rect">
+              <a:avLst/>
+            </a:prstGeom>
+            <a:noFill/>
+          </p:spPr>
+          <p:txBody>
+            <a:bodyPr wrap="none" rtlCol="0">
+              <a:spAutoFit/>
+            </a:bodyPr>
+            <a:lstStyle/>
+            <a:p>
+              <a:r>
+                <a:rPr lang="en-US" sz="2400" dirty="0" smtClean="0">
+                  <a:solidFill>
+                    <a:srgbClr val="FF0000"/>
+                  </a:solidFill>
+                </a:rPr>
+                <a:t>❺</a:t>
+              </a:r>
+              <a:endParaRPr lang="en-US" sz="2400" dirty="0">
+                <a:solidFill>
+                  <a:srgbClr val="FF0000"/>
+                </a:solidFill>
+              </a:endParaRPr>
+            </a:p>
+          </p:txBody>
+        </p:sp>
+      </p:grpSp>
+    </p:spTree>
+    <p:extLst>
+      <p:ext uri="{BB962C8B-B14F-4D97-AF65-F5344CB8AC3E}">
+        <p14:creationId xmlns:p14="http://schemas.microsoft.com/office/powerpoint/2010/main" val="3988044460"/>
+      </p:ext>
+    </p:extLst>
+  </p:cSld>
+  <p:clrMapOvr>
+    <a:masterClrMapping/>
+  </p:clrMapOvr>
+  <p:timing>
+    <p:tnLst>
+      <p:par>
+        <p:cTn id="1" dur="indefinite" restart="never" nodeType="tmRoot"/>
+      </p:par>
+    </p:tnLst>
+  </p:timing>
+</p:sld>
+</file>
+
 <file path=ppt/theme/theme1.xml><?xml version="1.0" encoding="utf-8"?>
 <a:theme xmlns:a="http://schemas.openxmlformats.org/drawingml/2006/main" name="Office Theme">
   <a:themeElements>

</xml_diff>